<commit_message>
Completed Sprint 3 report. Edited some formatting on the client presentation powerpoint
</commit_message>
<xml_diff>
--- a/Documents/ClientPresent2.pptx
+++ b/Documents/ClientPresent2.pptx
@@ -209,7 +209,7 @@
           <a:p>
             <a:fld id="{6FB66DF6-752B-44A8-85EB-BCFB4BEA1546}" type="datetimeFigureOut">
               <a:rPr lang="en-US" smtClean="0"/>
-              <a:t>12/3/2015</a:t>
+              <a:t>12/4/2015</a:t>
             </a:fld>
             <a:endParaRPr lang="en-US"/>
           </a:p>
@@ -789,6 +789,20 @@
               <a:rPr lang="en-US" dirty="0" smtClean="0"/>
               <a:t>Christine</a:t>
             </a:r>
+          </a:p>
+          <a:p>
+            <a:r>
+              <a:rPr lang="en-US" dirty="0" smtClean="0"/>
+              <a:t>Need to add dates</a:t>
+            </a:r>
+            <a:r>
+              <a:rPr lang="en-US" baseline="0" dirty="0" smtClean="0"/>
+              <a:t> for research </a:t>
+            </a:r>
+            <a:r>
+              <a:rPr lang="en-US" baseline="0" dirty="0" err="1" smtClean="0"/>
+              <a:t>synposium</a:t>
+            </a:r>
             <a:endParaRPr lang="en-US" dirty="0"/>
           </a:p>
         </p:txBody>
@@ -1724,7 +1738,7 @@
           <a:p>
             <a:fld id="{1209F774-2864-49B1-8321-83A0838F6E88}" type="datetimeFigureOut">
               <a:rPr lang="en-US" smtClean="0"/>
-              <a:t>12/3/2015</a:t>
+              <a:t>12/4/2015</a:t>
             </a:fld>
             <a:endParaRPr lang="en-US"/>
           </a:p>
@@ -2160,7 +2174,7 @@
           <a:p>
             <a:fld id="{1209F774-2864-49B1-8321-83A0838F6E88}" type="datetimeFigureOut">
               <a:rPr lang="en-US" smtClean="0"/>
-              <a:t>12/3/2015</a:t>
+              <a:t>12/4/2015</a:t>
             </a:fld>
             <a:endParaRPr lang="en-US"/>
           </a:p>
@@ -2410,7 +2424,7 @@
           <a:p>
             <a:fld id="{1209F774-2864-49B1-8321-83A0838F6E88}" type="datetimeFigureOut">
               <a:rPr lang="en-US" smtClean="0"/>
-              <a:t>12/3/2015</a:t>
+              <a:t>12/4/2015</a:t>
             </a:fld>
             <a:endParaRPr lang="en-US"/>
           </a:p>
@@ -2718,7 +2732,7 @@
           <a:p>
             <a:fld id="{1209F774-2864-49B1-8321-83A0838F6E88}" type="datetimeFigureOut">
               <a:rPr lang="en-US" smtClean="0"/>
-              <a:t>12/3/2015</a:t>
+              <a:t>12/4/2015</a:t>
             </a:fld>
             <a:endParaRPr lang="en-US"/>
           </a:p>
@@ -3036,7 +3050,7 @@
           <a:p>
             <a:fld id="{1209F774-2864-49B1-8321-83A0838F6E88}" type="datetimeFigureOut">
               <a:rPr lang="en-US" smtClean="0"/>
-              <a:t>12/3/2015</a:t>
+              <a:t>12/4/2015</a:t>
             </a:fld>
             <a:endParaRPr lang="en-US"/>
           </a:p>
@@ -3338,7 +3352,7 @@
           <a:p>
             <a:fld id="{1209F774-2864-49B1-8321-83A0838F6E88}" type="datetimeFigureOut">
               <a:rPr lang="en-US" smtClean="0"/>
-              <a:t>12/3/2015</a:t>
+              <a:t>12/4/2015</a:t>
             </a:fld>
             <a:endParaRPr lang="en-US"/>
           </a:p>
@@ -3705,7 +3719,7 @@
           <a:p>
             <a:fld id="{1209F774-2864-49B1-8321-83A0838F6E88}" type="datetimeFigureOut">
               <a:rPr lang="en-US" smtClean="0"/>
-              <a:t>12/3/2015</a:t>
+              <a:t>12/4/2015</a:t>
             </a:fld>
             <a:endParaRPr lang="en-US"/>
           </a:p>
@@ -3879,7 +3893,7 @@
           <a:p>
             <a:fld id="{1209F774-2864-49B1-8321-83A0838F6E88}" type="datetimeFigureOut">
               <a:rPr lang="en-US" smtClean="0"/>
-              <a:t>12/3/2015</a:t>
+              <a:t>12/4/2015</a:t>
             </a:fld>
             <a:endParaRPr lang="en-US"/>
           </a:p>
@@ -4059,7 +4073,7 @@
           <a:p>
             <a:fld id="{1209F774-2864-49B1-8321-83A0838F6E88}" type="datetimeFigureOut">
               <a:rPr lang="en-US" smtClean="0"/>
-              <a:t>12/3/2015</a:t>
+              <a:t>12/4/2015</a:t>
             </a:fld>
             <a:endParaRPr lang="en-US"/>
           </a:p>
@@ -4229,7 +4243,7 @@
           <a:p>
             <a:fld id="{1209F774-2864-49B1-8321-83A0838F6E88}" type="datetimeFigureOut">
               <a:rPr lang="en-US" smtClean="0"/>
-              <a:t>12/3/2015</a:t>
+              <a:t>12/4/2015</a:t>
             </a:fld>
             <a:endParaRPr lang="en-US"/>
           </a:p>
@@ -4479,7 +4493,7 @@
           <a:p>
             <a:fld id="{1209F774-2864-49B1-8321-83A0838F6E88}" type="datetimeFigureOut">
               <a:rPr lang="en-US" smtClean="0"/>
-              <a:t>12/3/2015</a:t>
+              <a:t>12/4/2015</a:t>
             </a:fld>
             <a:endParaRPr lang="en-US"/>
           </a:p>
@@ -4715,7 +4729,7 @@
           <a:p>
             <a:fld id="{1209F774-2864-49B1-8321-83A0838F6E88}" type="datetimeFigureOut">
               <a:rPr lang="en-US" smtClean="0"/>
-              <a:t>12/3/2015</a:t>
+              <a:t>12/4/2015</a:t>
             </a:fld>
             <a:endParaRPr lang="en-US"/>
           </a:p>
@@ -5097,7 +5111,7 @@
           <a:p>
             <a:fld id="{1209F774-2864-49B1-8321-83A0838F6E88}" type="datetimeFigureOut">
               <a:rPr lang="en-US" smtClean="0"/>
-              <a:t>12/3/2015</a:t>
+              <a:t>12/4/2015</a:t>
             </a:fld>
             <a:endParaRPr lang="en-US"/>
           </a:p>
@@ -5215,7 +5229,7 @@
           <a:p>
             <a:fld id="{1209F774-2864-49B1-8321-83A0838F6E88}" type="datetimeFigureOut">
               <a:rPr lang="en-US" smtClean="0"/>
-              <a:t>12/3/2015</a:t>
+              <a:t>12/4/2015</a:t>
             </a:fld>
             <a:endParaRPr lang="en-US"/>
           </a:p>
@@ -5310,7 +5324,7 @@
           <a:p>
             <a:fld id="{1209F774-2864-49B1-8321-83A0838F6E88}" type="datetimeFigureOut">
               <a:rPr lang="en-US" smtClean="0"/>
-              <a:t>12/3/2015</a:t>
+              <a:t>12/4/2015</a:t>
             </a:fld>
             <a:endParaRPr lang="en-US"/>
           </a:p>
@@ -5565,7 +5579,7 @@
           <a:p>
             <a:fld id="{1209F774-2864-49B1-8321-83A0838F6E88}" type="datetimeFigureOut">
               <a:rPr lang="en-US" smtClean="0"/>
-              <a:t>12/3/2015</a:t>
+              <a:t>12/4/2015</a:t>
             </a:fld>
             <a:endParaRPr lang="en-US"/>
           </a:p>
@@ -5848,7 +5862,7 @@
           <a:p>
             <a:fld id="{1209F774-2864-49B1-8321-83A0838F6E88}" type="datetimeFigureOut">
               <a:rPr lang="en-US" smtClean="0"/>
-              <a:t>12/3/2015</a:t>
+              <a:t>12/4/2015</a:t>
             </a:fld>
             <a:endParaRPr lang="en-US"/>
           </a:p>
@@ -6254,7 +6268,7 @@
           <a:p>
             <a:fld id="{1209F774-2864-49B1-8321-83A0838F6E88}" type="datetimeFigureOut">
               <a:rPr lang="en-US" smtClean="0"/>
-              <a:t>12/3/2015</a:t>
+              <a:t>12/4/2015</a:t>
             </a:fld>
             <a:endParaRPr lang="en-US"/>
           </a:p>
@@ -6961,7 +6975,7 @@
         <p:spPr>
           <a:xfrm>
             <a:off x="586935" y="1704661"/>
-            <a:ext cx="8001247" cy="2585323"/>
+            <a:ext cx="8001247" cy="2800767"/>
           </a:xfrm>
           <a:prstGeom prst="rect">
             <a:avLst/>
@@ -6979,7 +6993,7 @@
               <a:buChar char="•"/>
             </a:pPr>
             <a:r>
-              <a:rPr lang="en-US" dirty="0" smtClean="0">
+              <a:rPr lang="en-US" sz="2000" dirty="0" smtClean="0">
                 <a:solidFill>
                   <a:schemeClr val="tx1">
                     <a:lumMod val="85000"/>
@@ -6994,7 +7008,7 @@
               <a:buFont typeface="Arial" panose="020B0604020202020204" pitchFamily="34" charset="0"/>
               <a:buChar char="•"/>
             </a:pPr>
-            <a:endParaRPr lang="en-US" dirty="0">
+            <a:endParaRPr lang="en-US" sz="2000" dirty="0">
               <a:solidFill>
                 <a:schemeClr val="tx1">
                   <a:lumMod val="85000"/>
@@ -7008,7 +7022,7 @@
               <a:buChar char="•"/>
             </a:pPr>
             <a:r>
-              <a:rPr lang="en-US" dirty="0" smtClean="0">
+              <a:rPr lang="en-US" sz="2000" dirty="0" smtClean="0">
                 <a:solidFill>
                   <a:schemeClr val="tx1">
                     <a:lumMod val="85000"/>
@@ -7024,7 +7038,7 @@
               <a:buChar char="•"/>
             </a:pPr>
             <a:r>
-              <a:rPr lang="en-US" dirty="0" smtClean="0">
+              <a:rPr lang="en-US" sz="2000" dirty="0" smtClean="0">
                 <a:solidFill>
                   <a:schemeClr val="tx1">
                     <a:lumMod val="85000"/>
@@ -7034,7 +7048,7 @@
               <a:t> 8.5 </a:t>
             </a:r>
             <a:r>
-              <a:rPr lang="en-US" dirty="0" err="1" smtClean="0">
+              <a:rPr lang="en-US" sz="2000" dirty="0" err="1" smtClean="0">
                 <a:solidFill>
                   <a:schemeClr val="tx1">
                     <a:lumMod val="85000"/>
@@ -7043,7 +7057,7 @@
               </a:rPr>
               <a:t>GigaFlops</a:t>
             </a:r>
-            <a:endParaRPr lang="en-US" dirty="0">
+            <a:endParaRPr lang="en-US" sz="2000" dirty="0">
               <a:solidFill>
                 <a:schemeClr val="tx1">
                   <a:lumMod val="85000"/>
@@ -7056,7 +7070,7 @@
               <a:buFont typeface="Arial" panose="020B0604020202020204" pitchFamily="34" charset="0"/>
               <a:buChar char="•"/>
             </a:pPr>
-            <a:endParaRPr lang="en-US" dirty="0" smtClean="0">
+            <a:endParaRPr lang="en-US" sz="2000" dirty="0" smtClean="0">
               <a:solidFill>
                 <a:schemeClr val="tx1">
                   <a:lumMod val="85000"/>
@@ -7070,7 +7084,7 @@
               <a:buChar char="•"/>
             </a:pPr>
             <a:r>
-              <a:rPr lang="en-US" dirty="0" smtClean="0">
+              <a:rPr lang="en-US" sz="2000" dirty="0" smtClean="0">
                 <a:solidFill>
                   <a:schemeClr val="tx1">
                     <a:lumMod val="85000"/>
@@ -7086,7 +7100,7 @@
               <a:buChar char="•"/>
             </a:pPr>
             <a:r>
-              <a:rPr lang="en-US" dirty="0" smtClean="0">
+              <a:rPr lang="en-US" sz="2000" dirty="0" smtClean="0">
                 <a:solidFill>
                   <a:schemeClr val="tx1">
                     <a:lumMod val="85000"/>
@@ -7096,7 +7110,7 @@
               <a:t>6.3 </a:t>
             </a:r>
             <a:r>
-              <a:rPr lang="en-US" dirty="0" err="1" smtClean="0">
+              <a:rPr lang="en-US" sz="2000" dirty="0" err="1" smtClean="0">
                 <a:solidFill>
                   <a:schemeClr val="tx1">
                     <a:lumMod val="85000"/>
@@ -7105,7 +7119,7 @@
               </a:rPr>
               <a:t>GigaFlops</a:t>
             </a:r>
-            <a:endParaRPr lang="en-US" dirty="0" smtClean="0">
+            <a:endParaRPr lang="en-US" sz="2000" dirty="0" smtClean="0">
               <a:solidFill>
                 <a:schemeClr val="tx1">
                   <a:lumMod val="85000"/>
@@ -7214,8 +7228,8 @@
         </p:nvSpPr>
         <p:spPr>
           <a:xfrm>
-            <a:off x="528569" y="1830961"/>
-            <a:ext cx="8001247" cy="4247317"/>
+            <a:off x="586935" y="1631668"/>
+            <a:ext cx="8001247" cy="4678204"/>
           </a:xfrm>
           <a:prstGeom prst="rect">
             <a:avLst/>
@@ -7233,7 +7247,7 @@
               <a:buChar char="•"/>
             </a:pPr>
             <a:r>
-              <a:rPr lang="en-US" dirty="0" smtClean="0">
+              <a:rPr lang="en-US" sz="2000" dirty="0" smtClean="0">
                 <a:solidFill>
                   <a:schemeClr val="tx1">
                     <a:lumMod val="85000"/>
@@ -7249,7 +7263,7 @@
               <a:buChar char="•"/>
             </a:pPr>
             <a:r>
-              <a:rPr lang="en-US" dirty="0" smtClean="0">
+              <a:rPr lang="en-US" sz="2000" dirty="0" smtClean="0">
                 <a:solidFill>
                   <a:schemeClr val="tx1">
                     <a:lumMod val="85000"/>
@@ -7258,7 +7272,13 @@
               </a:rPr>
               <a:t>(1) $</a:t>
             </a:r>
-            <a:endParaRPr lang="en-US" dirty="0" smtClean="0">
+          </a:p>
+          <a:p>
+            <a:pPr marL="285750" indent="-285750">
+              <a:buFont typeface="Arial" panose="020B0604020202020204" pitchFamily="34" charset="0"/>
+              <a:buChar char="•"/>
+            </a:pPr>
+            <a:endParaRPr lang="en-US" sz="2000" dirty="0">
               <a:solidFill>
                 <a:schemeClr val="tx1">
                   <a:lumMod val="85000"/>
@@ -7271,7 +7291,55 @@
               <a:buFont typeface="Arial" panose="020B0604020202020204" pitchFamily="34" charset="0"/>
               <a:buChar char="•"/>
             </a:pPr>
-            <a:endParaRPr lang="en-US" dirty="0">
+            <a:r>
+              <a:rPr lang="en-US" sz="2000" dirty="0" smtClean="0">
+                <a:solidFill>
+                  <a:schemeClr val="tx1">
+                    <a:lumMod val="85000"/>
+                  </a:schemeClr>
+                </a:solidFill>
+              </a:rPr>
+              <a:t>Ethernet cables  </a:t>
+            </a:r>
+          </a:p>
+          <a:p>
+            <a:pPr marL="742950" lvl="1" indent="-285750">
+              <a:buFont typeface="Arial" panose="020B0604020202020204" pitchFamily="34" charset="0"/>
+              <a:buChar char="•"/>
+            </a:pPr>
+            <a:r>
+              <a:rPr lang="en-US" sz="2000" dirty="0" smtClean="0">
+                <a:solidFill>
+                  <a:schemeClr val="tx1">
+                    <a:lumMod val="85000"/>
+                  </a:schemeClr>
+                </a:solidFill>
+              </a:rPr>
+              <a:t>(8) 1’  $2.99 each </a:t>
+            </a:r>
+          </a:p>
+          <a:p>
+            <a:pPr marL="742950" lvl="1" indent="-285750">
+              <a:buFont typeface="Arial" panose="020B0604020202020204" pitchFamily="34" charset="0"/>
+              <a:buChar char="•"/>
+            </a:pPr>
+            <a:r>
+              <a:rPr lang="en-US" sz="2000" dirty="0" smtClean="0">
+                <a:solidFill>
+                  <a:schemeClr val="tx1">
+                    <a:lumMod val="85000"/>
+                  </a:schemeClr>
+                </a:solidFill>
+              </a:rPr>
+              <a:t>3’  $4.99 each</a:t>
+            </a:r>
+          </a:p>
+          <a:p>
+            <a:pPr marL="742950" lvl="1" indent="-285750">
+              <a:buFont typeface="Arial" panose="020B0604020202020204" pitchFamily="34" charset="0"/>
+              <a:buChar char="•"/>
+            </a:pPr>
+            <a:endParaRPr lang="en-US" sz="2000" dirty="0">
               <a:solidFill>
                 <a:schemeClr val="tx1">
                   <a:lumMod val="85000"/>
@@ -7285,14 +7353,14 @@
               <a:buChar char="•"/>
             </a:pPr>
             <a:r>
-              <a:rPr lang="en-US" dirty="0" smtClean="0">
+              <a:rPr lang="en-US" sz="2000" dirty="0" smtClean="0">
                 <a:solidFill>
                   <a:schemeClr val="tx1">
                     <a:lumMod val="85000"/>
                   </a:schemeClr>
                 </a:solidFill>
               </a:rPr>
-              <a:t>Ethernet cables  </a:t>
+              <a:t>Power Unit</a:t>
             </a:r>
           </a:p>
           <a:p>
@@ -7301,38 +7369,19 @@
               <a:buChar char="•"/>
             </a:pPr>
             <a:r>
-              <a:rPr lang="en-US" dirty="0" smtClean="0">
+              <a:rPr lang="en-US" sz="2000" dirty="0" smtClean="0">
                 <a:solidFill>
                   <a:schemeClr val="tx1">
                     <a:lumMod val="85000"/>
                   </a:schemeClr>
                 </a:solidFill>
               </a:rPr>
-              <a:t>(8) 1’  $2.99 each </a:t>
-            </a:r>
-          </a:p>
-          <a:p>
-            <a:pPr marL="742950" lvl="1" indent="-285750">
-              <a:buFont typeface="Arial" panose="020B0604020202020204" pitchFamily="34" charset="0"/>
-              <a:buChar char="•"/>
-            </a:pPr>
-            <a:r>
-              <a:rPr lang="en-US" dirty="0" smtClean="0">
-                <a:solidFill>
-                  <a:schemeClr val="tx1">
-                    <a:lumMod val="85000"/>
-                  </a:schemeClr>
-                </a:solidFill>
-              </a:rPr>
-              <a:t>3’  $4.99 each</a:t>
-            </a:r>
-          </a:p>
-          <a:p>
-            <a:pPr marL="742950" lvl="1" indent="-285750">
-              <a:buFont typeface="Arial" panose="020B0604020202020204" pitchFamily="34" charset="0"/>
-              <a:buChar char="•"/>
-            </a:pPr>
-            <a:endParaRPr lang="en-US" dirty="0">
+              <a:t>(1) $</a:t>
+            </a:r>
+          </a:p>
+          <a:p>
+            <a:pPr lvl="1"/>
+            <a:endParaRPr lang="en-US" sz="2000" dirty="0">
               <a:solidFill>
                 <a:schemeClr val="tx1">
                   <a:lumMod val="85000"/>
@@ -7346,14 +7395,14 @@
               <a:buChar char="•"/>
             </a:pPr>
             <a:r>
-              <a:rPr lang="en-US" dirty="0" smtClean="0">
+              <a:rPr lang="en-US" sz="2000" dirty="0" smtClean="0">
                 <a:solidFill>
                   <a:schemeClr val="tx1">
                     <a:lumMod val="85000"/>
                   </a:schemeClr>
                 </a:solidFill>
               </a:rPr>
-              <a:t>Power Unit</a:t>
+              <a:t>Memory</a:t>
             </a:r>
           </a:p>
           <a:p>
@@ -7362,16 +7411,22 @@
               <a:buChar char="•"/>
             </a:pPr>
             <a:r>
-              <a:rPr lang="en-US" dirty="0" smtClean="0">
+              <a:rPr lang="en-US" sz="2000" dirty="0" smtClean="0">
                 <a:solidFill>
                   <a:schemeClr val="tx1">
                     <a:lumMod val="85000"/>
                   </a:schemeClr>
                 </a:solidFill>
               </a:rPr>
-              <a:t>(1) $</a:t>
-            </a:r>
-            <a:endParaRPr lang="en-US" dirty="0" smtClean="0">
+              <a:t>(8) 16 GB  $38.00 each </a:t>
+            </a:r>
+          </a:p>
+          <a:p>
+            <a:pPr marL="742950" lvl="1" indent="-285750">
+              <a:buFont typeface="Arial" panose="020B0604020202020204" pitchFamily="34" charset="0"/>
+              <a:buChar char="•"/>
+            </a:pPr>
+            <a:endParaRPr lang="en-US" sz="2000" dirty="0">
               <a:solidFill>
                 <a:schemeClr val="tx1">
                   <a:lumMod val="85000"/>
@@ -7380,8 +7435,31 @@
             </a:endParaRPr>
           </a:p>
           <a:p>
-            <a:pPr lvl="1"/>
-            <a:endParaRPr lang="en-US" dirty="0">
+            <a:pPr marL="285750" indent="-285750">
+              <a:buFont typeface="Arial" panose="020B0604020202020204" pitchFamily="34" charset="0"/>
+              <a:buChar char="•"/>
+            </a:pPr>
+            <a:r>
+              <a:rPr lang="en-US" sz="2000" dirty="0" smtClean="0">
+                <a:solidFill>
+                  <a:schemeClr val="tx1">
+                    <a:lumMod val="85000"/>
+                  </a:schemeClr>
+                </a:solidFill>
+              </a:rPr>
+              <a:t>ODROID Ux</a:t>
+            </a:r>
+            <a:r>
+              <a:rPr lang="en-US" sz="2000" dirty="0">
+                <a:solidFill>
+                  <a:schemeClr val="tx1">
+                    <a:lumMod val="85000"/>
+                  </a:schemeClr>
+                </a:solidFill>
+              </a:rPr>
+              <a:t>4</a:t>
+            </a:r>
+            <a:endParaRPr lang="en-US" sz="2000" dirty="0" smtClean="0">
               <a:solidFill>
                 <a:schemeClr val="tx1">
                   <a:lumMod val="85000"/>
@@ -7390,100 +7468,12 @@
             </a:endParaRPr>
           </a:p>
           <a:p>
-            <a:pPr marL="285750" indent="-285750">
-              <a:buFont typeface="Arial" panose="020B0604020202020204" pitchFamily="34" charset="0"/>
-              <a:buChar char="•"/>
-            </a:pPr>
-            <a:r>
-              <a:rPr lang="en-US" dirty="0" smtClean="0">
-                <a:solidFill>
-                  <a:schemeClr val="tx1">
-                    <a:lumMod val="85000"/>
-                  </a:schemeClr>
-                </a:solidFill>
-              </a:rPr>
-              <a:t>Memory</a:t>
-            </a:r>
-          </a:p>
-          <a:p>
             <a:pPr marL="742950" lvl="1" indent="-285750">
               <a:buFont typeface="Arial" panose="020B0604020202020204" pitchFamily="34" charset="0"/>
               <a:buChar char="•"/>
             </a:pPr>
             <a:r>
-              <a:rPr lang="en-US" dirty="0" smtClean="0">
-                <a:solidFill>
-                  <a:schemeClr val="tx1">
-                    <a:lumMod val="85000"/>
-                  </a:schemeClr>
-                </a:solidFill>
-              </a:rPr>
-              <a:t>(8) </a:t>
-            </a:r>
-            <a:r>
-              <a:rPr lang="en-US" dirty="0" smtClean="0">
-                <a:solidFill>
-                  <a:schemeClr val="tx1">
-                    <a:lumMod val="85000"/>
-                  </a:schemeClr>
-                </a:solidFill>
-              </a:rPr>
-              <a:t>16 GB  $38.00 each </a:t>
-            </a:r>
-          </a:p>
-          <a:p>
-            <a:pPr marL="742950" lvl="1" indent="-285750">
-              <a:buFont typeface="Arial" panose="020B0604020202020204" pitchFamily="34" charset="0"/>
-              <a:buChar char="•"/>
-            </a:pPr>
-            <a:endParaRPr lang="en-US" dirty="0">
-              <a:solidFill>
-                <a:schemeClr val="tx1">
-                  <a:lumMod val="85000"/>
-                </a:schemeClr>
-              </a:solidFill>
-            </a:endParaRPr>
-          </a:p>
-          <a:p>
-            <a:pPr marL="285750" indent="-285750">
-              <a:buFont typeface="Arial" panose="020B0604020202020204" pitchFamily="34" charset="0"/>
-              <a:buChar char="•"/>
-            </a:pPr>
-            <a:r>
-              <a:rPr lang="en-US" dirty="0" smtClean="0">
-                <a:solidFill>
-                  <a:schemeClr val="tx1">
-                    <a:lumMod val="85000"/>
-                  </a:schemeClr>
-                </a:solidFill>
-              </a:rPr>
-              <a:t>ODROID Ux</a:t>
-            </a:r>
-            <a:r>
-              <a:rPr lang="en-US" dirty="0">
-                <a:solidFill>
-                  <a:schemeClr val="tx1">
-                    <a:lumMod val="85000"/>
-                  </a:schemeClr>
-                </a:solidFill>
-              </a:rPr>
-              <a:t>4</a:t>
-            </a:r>
-            <a:endParaRPr lang="en-US" dirty="0" smtClean="0">
-              <a:solidFill>
-                <a:schemeClr val="tx1">
-                  <a:lumMod val="85000"/>
-                </a:schemeClr>
-              </a:solidFill>
-            </a:endParaRPr>
-          </a:p>
-          <a:p>
-            <a:pPr marL="742950" lvl="1" indent="-285750">
-              <a:buFont typeface="Arial" panose="020B0604020202020204" pitchFamily="34" charset="0"/>
-              <a:buChar char="•"/>
-            </a:pPr>
-            <a:r>
-              <a:rPr lang="en-US" dirty="0" smtClean="0">
+              <a:rPr lang="en-US" sz="2000" dirty="0" smtClean="0">
                 <a:solidFill>
                   <a:schemeClr val="tx1">
                     <a:lumMod val="85000"/>
@@ -7492,7 +7482,7 @@
               </a:rPr>
               <a:t>(8) $76.00 each</a:t>
             </a:r>
-            <a:endParaRPr lang="en-US" dirty="0">
+            <a:endParaRPr lang="en-US" sz="2000" dirty="0">
               <a:solidFill>
                 <a:schemeClr val="tx1">
                   <a:lumMod val="85000"/>
@@ -7576,7 +7566,7 @@
         <p:spPr>
           <a:xfrm>
             <a:off x="636915" y="2021489"/>
-            <a:ext cx="8001247" cy="923330"/>
+            <a:ext cx="8001247" cy="1015663"/>
           </a:xfrm>
           <a:prstGeom prst="rect">
             <a:avLst/>
@@ -7594,7 +7584,7 @@
               <a:buChar char="•"/>
             </a:pPr>
             <a:r>
-              <a:rPr lang="en-US" dirty="0" smtClean="0">
+              <a:rPr lang="en-US" sz="2000" dirty="0" smtClean="0">
                 <a:solidFill>
                   <a:schemeClr val="tx1">
                     <a:lumMod val="85000"/>
@@ -7609,7 +7599,7 @@
               <a:buFont typeface="Arial" panose="020B0604020202020204" pitchFamily="34" charset="0"/>
               <a:buChar char="•"/>
             </a:pPr>
-            <a:endParaRPr lang="en-US" dirty="0">
+            <a:endParaRPr lang="en-US" sz="2000" dirty="0">
               <a:solidFill>
                 <a:schemeClr val="tx1">
                   <a:lumMod val="85000"/>
@@ -7623,7 +7613,7 @@
               <a:buChar char="•"/>
             </a:pPr>
             <a:r>
-              <a:rPr lang="en-US" dirty="0" smtClean="0">
+              <a:rPr lang="en-US" sz="2000" dirty="0" smtClean="0">
                 <a:solidFill>
                   <a:schemeClr val="tx1">
                     <a:lumMod val="85000"/>
@@ -7632,7 +7622,7 @@
               </a:rPr>
               <a:t>Develop and benchmark a new communication</a:t>
             </a:r>
-            <a:endParaRPr lang="en-US" dirty="0">
+            <a:endParaRPr lang="en-US" sz="2000" dirty="0">
               <a:solidFill>
                 <a:schemeClr val="tx1">
                   <a:lumMod val="85000"/>
@@ -7716,7 +7706,7 @@
         <p:spPr>
           <a:xfrm>
             <a:off x="636915" y="2021489"/>
-            <a:ext cx="8001247" cy="2862322"/>
+            <a:ext cx="8001247" cy="3170099"/>
           </a:xfrm>
           <a:prstGeom prst="rect">
             <a:avLst/>
@@ -7734,7 +7724,7 @@
               <a:buChar char="•"/>
             </a:pPr>
             <a:r>
-              <a:rPr lang="en-US" dirty="0" smtClean="0">
+              <a:rPr lang="en-US" sz="2000" dirty="0" smtClean="0">
                 <a:solidFill>
                   <a:schemeClr val="tx1">
                     <a:lumMod val="85000"/>
@@ -7750,7 +7740,7 @@
               <a:buChar char="•"/>
             </a:pPr>
             <a:r>
-              <a:rPr lang="en-US" dirty="0" smtClean="0">
+              <a:rPr lang="en-US" sz="2000" dirty="0" smtClean="0">
                 <a:solidFill>
                   <a:schemeClr val="tx1">
                     <a:lumMod val="85000"/>
@@ -7765,7 +7755,7 @@
               <a:buFont typeface="Arial" panose="020B0604020202020204" pitchFamily="34" charset="0"/>
               <a:buChar char="•"/>
             </a:pPr>
-            <a:endParaRPr lang="en-US" dirty="0">
+            <a:endParaRPr lang="en-US" sz="2000" dirty="0">
               <a:solidFill>
                 <a:schemeClr val="tx1">
                   <a:lumMod val="85000"/>
@@ -7779,7 +7769,7 @@
               <a:buChar char="•"/>
             </a:pPr>
             <a:r>
-              <a:rPr lang="en-US" dirty="0" smtClean="0">
+              <a:rPr lang="en-US" sz="2000" dirty="0" smtClean="0">
                 <a:solidFill>
                   <a:schemeClr val="tx1">
                     <a:lumMod val="85000"/>
@@ -7795,7 +7785,7 @@
               <a:buChar char="•"/>
             </a:pPr>
             <a:r>
-              <a:rPr lang="en-US" dirty="0" smtClean="0">
+              <a:rPr lang="en-US" sz="2000" dirty="0" smtClean="0">
                 <a:solidFill>
                   <a:schemeClr val="tx1">
                     <a:lumMod val="85000"/>
@@ -7810,7 +7800,7 @@
               <a:buFont typeface="Arial" panose="020B0604020202020204" pitchFamily="34" charset="0"/>
               <a:buChar char="•"/>
             </a:pPr>
-            <a:endParaRPr lang="en-US" dirty="0">
+            <a:endParaRPr lang="en-US" sz="2000" dirty="0">
               <a:solidFill>
                 <a:schemeClr val="tx1">
                   <a:lumMod val="85000"/>
@@ -7824,7 +7814,7 @@
               <a:buChar char="•"/>
             </a:pPr>
             <a:r>
-              <a:rPr lang="en-US" dirty="0" smtClean="0">
+              <a:rPr lang="en-US" sz="2000" dirty="0" smtClean="0">
                 <a:solidFill>
                   <a:schemeClr val="tx1">
                     <a:lumMod val="85000"/>
@@ -7840,7 +7830,7 @@
               <a:buChar char="•"/>
             </a:pPr>
             <a:r>
-              <a:rPr lang="en-US" dirty="0" smtClean="0">
+              <a:rPr lang="en-US" sz="2000" dirty="0" smtClean="0">
                 <a:solidFill>
                   <a:schemeClr val="tx1">
                     <a:lumMod val="85000"/>
@@ -7855,7 +7845,7 @@
               <a:buFont typeface="Arial" panose="020B0604020202020204" pitchFamily="34" charset="0"/>
               <a:buChar char="•"/>
             </a:pPr>
-            <a:endParaRPr lang="en-US" dirty="0">
+            <a:endParaRPr lang="en-US" sz="2000" dirty="0">
               <a:solidFill>
                 <a:schemeClr val="tx1">
                   <a:lumMod val="85000"/>
@@ -7869,7 +7859,7 @@
               <a:buChar char="•"/>
             </a:pPr>
             <a:r>
-              <a:rPr lang="en-US" dirty="0" smtClean="0">
+              <a:rPr lang="en-US" sz="2000" dirty="0" smtClean="0">
                 <a:solidFill>
                   <a:schemeClr val="tx1">
                     <a:lumMod val="85000"/>
@@ -7878,13 +7868,6 @@
               </a:rPr>
               <a:t>Design Fair: 4/19/16</a:t>
             </a:r>
-            <a:endParaRPr lang="en-US" dirty="0" smtClean="0">
-              <a:solidFill>
-                <a:schemeClr val="tx1">
-                  <a:lumMod val="85000"/>
-                </a:schemeClr>
-              </a:solidFill>
-            </a:endParaRPr>
           </a:p>
         </p:txBody>
       </p:sp>
@@ -7962,7 +7945,7 @@
         <p:spPr>
           <a:xfrm>
             <a:off x="636915" y="2021489"/>
-            <a:ext cx="8001247" cy="369332"/>
+            <a:ext cx="8001247" cy="400110"/>
           </a:xfrm>
           <a:prstGeom prst="rect">
             <a:avLst/>
@@ -7980,7 +7963,7 @@
               <a:buChar char="•"/>
             </a:pPr>
             <a:r>
-              <a:rPr lang="en-US" dirty="0" smtClean="0">
+              <a:rPr lang="en-US" sz="2000" dirty="0" smtClean="0">
                 <a:solidFill>
                   <a:schemeClr val="tx1">
                     <a:lumMod val="85000"/>
@@ -7990,7 +7973,7 @@
               <a:t>Dr. Christer </a:t>
             </a:r>
             <a:r>
-              <a:rPr lang="en-US" dirty="0" err="1" smtClean="0">
+              <a:rPr lang="en-US" sz="2000" dirty="0" err="1" smtClean="0">
                 <a:solidFill>
                   <a:schemeClr val="tx1">
                     <a:lumMod val="85000"/>
@@ -7999,7 +7982,7 @@
               </a:rPr>
               <a:t>Karlsson</a:t>
             </a:r>
-            <a:endParaRPr lang="en-US" dirty="0">
+            <a:endParaRPr lang="en-US" sz="2000" dirty="0">
               <a:solidFill>
                 <a:schemeClr val="tx1">
                   <a:lumMod val="85000"/>
@@ -8125,7 +8108,7 @@
         <p:spPr>
           <a:xfrm>
             <a:off x="636914" y="4508527"/>
-            <a:ext cx="8001247" cy="923330"/>
+            <a:ext cx="8001247" cy="1015663"/>
           </a:xfrm>
           <a:prstGeom prst="rect">
             <a:avLst/>
@@ -8143,7 +8126,7 @@
               <a:buChar char="•"/>
             </a:pPr>
             <a:r>
-              <a:rPr lang="en-US" dirty="0" smtClean="0">
+              <a:rPr lang="en-US" sz="2000" dirty="0" smtClean="0">
                 <a:solidFill>
                   <a:schemeClr val="tx1">
                     <a:lumMod val="85000"/>
@@ -8159,7 +8142,7 @@
               <a:buChar char="•"/>
             </a:pPr>
             <a:r>
-              <a:rPr lang="en-US" dirty="0" smtClean="0">
+              <a:rPr lang="en-US" sz="2000" dirty="0" smtClean="0">
                 <a:solidFill>
                   <a:schemeClr val="tx1">
                     <a:lumMod val="85000"/>
@@ -8175,7 +8158,7 @@
               <a:buChar char="•"/>
             </a:pPr>
             <a:r>
-              <a:rPr lang="en-US" dirty="0" smtClean="0">
+              <a:rPr lang="en-US" sz="2000" dirty="0" smtClean="0">
                 <a:solidFill>
                   <a:schemeClr val="tx1">
                     <a:lumMod val="85000"/>
@@ -8184,7 +8167,7 @@
               </a:rPr>
               <a:t>Fastest and most efficient</a:t>
             </a:r>
-            <a:endParaRPr lang="en-US" dirty="0">
+            <a:endParaRPr lang="en-US" sz="2000" dirty="0">
               <a:solidFill>
                 <a:schemeClr val="tx1">
                   <a:lumMod val="85000"/>
@@ -8268,7 +8251,7 @@
         <p:spPr>
           <a:xfrm>
             <a:off x="528569" y="1830961"/>
-            <a:ext cx="8001247" cy="1477328"/>
+            <a:ext cx="8001247" cy="1569660"/>
           </a:xfrm>
           <a:prstGeom prst="rect">
             <a:avLst/>
@@ -8299,7 +8282,7 @@
               <a:buChar char="•"/>
             </a:pPr>
             <a:r>
-              <a:rPr lang="en-US" dirty="0" smtClean="0">
+              <a:rPr lang="en-US" sz="2000" dirty="0" smtClean="0">
                 <a:solidFill>
                   <a:schemeClr val="tx1">
                     <a:lumMod val="85000"/>
@@ -8314,7 +8297,7 @@
               <a:buFont typeface="Arial" panose="020B0604020202020204" pitchFamily="34" charset="0"/>
               <a:buChar char="•"/>
             </a:pPr>
-            <a:endParaRPr lang="en-US" dirty="0">
+            <a:endParaRPr lang="en-US" sz="2000" dirty="0">
               <a:solidFill>
                 <a:schemeClr val="tx1">
                   <a:lumMod val="85000"/>
@@ -8328,15 +8311,32 @@
               <a:buChar char="•"/>
             </a:pPr>
             <a:r>
-              <a:rPr lang="en-US" dirty="0" smtClean="0">
+              <a:rPr lang="en-US" sz="2000" dirty="0" smtClean="0">
                 <a:solidFill>
                   <a:schemeClr val="tx1">
                     <a:lumMod val="85000"/>
                   </a:schemeClr>
                 </a:solidFill>
               </a:rPr>
-              <a:t>Establish proof of Concept</a:t>
-            </a:r>
+              <a:t>Establish proof of </a:t>
+            </a:r>
+            <a:r>
+              <a:rPr lang="en-US" sz="2000" dirty="0" smtClean="0">
+                <a:solidFill>
+                  <a:schemeClr val="tx1">
+                    <a:lumMod val="85000"/>
+                  </a:schemeClr>
+                </a:solidFill>
+              </a:rPr>
+              <a:t>concept</a:t>
+            </a:r>
+            <a:endParaRPr lang="en-US" sz="2000" dirty="0" smtClean="0">
+              <a:solidFill>
+                <a:schemeClr val="tx1">
+                  <a:lumMod val="85000"/>
+                </a:schemeClr>
+              </a:solidFill>
+            </a:endParaRPr>
           </a:p>
           <a:p>
             <a:pPr marL="285750" indent="-285750">
@@ -8426,8 +8426,8 @@
         </p:nvSpPr>
         <p:spPr>
           <a:xfrm>
-            <a:off x="636915" y="2021489"/>
-            <a:ext cx="8001247" cy="646331"/>
+            <a:off x="250053" y="1889327"/>
+            <a:ext cx="8001247" cy="707886"/>
           </a:xfrm>
           <a:prstGeom prst="rect">
             <a:avLst/>
@@ -8445,7 +8445,7 @@
               <a:buChar char="•"/>
             </a:pPr>
             <a:r>
-              <a:rPr lang="en-US" dirty="0" smtClean="0">
+              <a:rPr lang="en-US" sz="2000" dirty="0" smtClean="0">
                 <a:solidFill>
                   <a:schemeClr val="tx1">
                     <a:lumMod val="85000"/>
@@ -8461,27 +8461,27 @@
               <a:buChar char="•"/>
             </a:pPr>
             <a:r>
-              <a:rPr lang="en-US" dirty="0" smtClean="0">
+              <a:rPr lang="en-US" sz="2000" dirty="0" smtClean="0">
                 <a:solidFill>
                   <a:schemeClr val="tx1">
                     <a:lumMod val="85000"/>
                   </a:schemeClr>
                 </a:solidFill>
               </a:rPr>
-              <a:t>ODROID Ux</a:t>
-            </a:r>
-            <a:r>
-              <a:rPr lang="en-US" dirty="0">
+              <a:t>ODROID </a:t>
+            </a:r>
+            <a:r>
+              <a:rPr lang="en-US" sz="2000" dirty="0" smtClean="0">
                 <a:solidFill>
                   <a:schemeClr val="tx1">
                     <a:lumMod val="85000"/>
                   </a:schemeClr>
                 </a:solidFill>
               </a:rPr>
-              <a:t>4</a:t>
-            </a:r>
-            <a:r>
-              <a:rPr lang="en-US" dirty="0" smtClean="0">
+              <a:t>XU4</a:t>
+            </a:r>
+            <a:r>
+              <a:rPr lang="en-US" sz="2000" dirty="0" smtClean="0">
                 <a:solidFill>
                   <a:schemeClr val="tx1">
                     <a:lumMod val="85000"/>
@@ -8490,7 +8490,7 @@
               </a:rPr>
               <a:t> </a:t>
             </a:r>
-            <a:endParaRPr lang="en-US" dirty="0">
+            <a:endParaRPr lang="en-US" sz="2000" dirty="0">
               <a:solidFill>
                 <a:schemeClr val="tx1">
                   <a:lumMod val="85000"/>
@@ -8521,12 +8521,42 @@
         </p:blipFill>
         <p:spPr>
           <a:xfrm rot="5400000">
-            <a:off x="1341909" y="2816295"/>
+            <a:off x="1313053" y="2523461"/>
             <a:ext cx="2878282" cy="4624151"/>
           </a:xfrm>
           <a:prstGeom prst="rect">
             <a:avLst/>
           </a:prstGeom>
+          <a:solidFill>
+            <a:srgbClr val="FFFFFF">
+              <a:shade val="85000"/>
+            </a:srgbClr>
+          </a:solidFill>
+          <a:ln w="88900" cap="sq">
+            <a:solidFill>
+              <a:srgbClr val="FFFFFF"/>
+            </a:solidFill>
+            <a:miter lim="800000"/>
+          </a:ln>
+          <a:effectLst>
+            <a:outerShdw blurRad="55000" dist="18000" dir="5400000" algn="tl" rotWithShape="0">
+              <a:srgbClr val="000000">
+                <a:alpha val="40000"/>
+              </a:srgbClr>
+            </a:outerShdw>
+          </a:effectLst>
+          <a:scene3d>
+            <a:camera prst="orthographicFront"/>
+            <a:lightRig rig="twoPt" dir="t">
+              <a:rot lat="0" lon="0" rev="7200000"/>
+            </a:lightRig>
+          </a:scene3d>
+          <a:sp3d>
+            <a:bevelT w="25400" h="19050"/>
+            <a:contourClr>
+              <a:srgbClr val="FFFFFF"/>
+            </a:contourClr>
+          </a:sp3d>
         </p:spPr>
       </p:pic>
       <p:pic>
@@ -8556,6 +8586,36 @@
           <a:prstGeom prst="rect">
             <a:avLst/>
           </a:prstGeom>
+          <a:solidFill>
+            <a:srgbClr val="FFFFFF">
+              <a:shade val="85000"/>
+            </a:srgbClr>
+          </a:solidFill>
+          <a:ln w="88900" cap="sq">
+            <a:solidFill>
+              <a:srgbClr val="FFFFFF"/>
+            </a:solidFill>
+            <a:miter lim="800000"/>
+          </a:ln>
+          <a:effectLst>
+            <a:outerShdw blurRad="55000" dist="18000" dir="5400000" algn="tl" rotWithShape="0">
+              <a:srgbClr val="000000">
+                <a:alpha val="40000"/>
+              </a:srgbClr>
+            </a:outerShdw>
+          </a:effectLst>
+          <a:scene3d>
+            <a:camera prst="orthographicFront"/>
+            <a:lightRig rig="twoPt" dir="t">
+              <a:rot lat="0" lon="0" rev="7200000"/>
+            </a:lightRig>
+          </a:scene3d>
+          <a:sp3d>
+            <a:bevelT w="25400" h="19050"/>
+            <a:contourClr>
+              <a:srgbClr val="FFFFFF"/>
+            </a:contourClr>
+          </a:sp3d>
         </p:spPr>
       </p:pic>
     </p:spTree>
@@ -8632,7 +8692,7 @@
         <p:spPr>
           <a:xfrm>
             <a:off x="586935" y="1539132"/>
-            <a:ext cx="8001247" cy="3693319"/>
+            <a:ext cx="8001247" cy="4031873"/>
           </a:xfrm>
           <a:prstGeom prst="rect">
             <a:avLst/>
@@ -8649,7 +8709,7 @@
               <a:buFont typeface="Arial" panose="020B0604020202020204" pitchFamily="34" charset="0"/>
               <a:buChar char="•"/>
             </a:pPr>
-            <a:endParaRPr lang="en-US" dirty="0" smtClean="0">
+            <a:endParaRPr lang="en-US" sz="2000" dirty="0" smtClean="0">
               <a:solidFill>
                 <a:schemeClr val="tx1">
                   <a:lumMod val="85000"/>
@@ -8662,7 +8722,7 @@
               <a:buFont typeface="Arial" panose="020B0604020202020204" pitchFamily="34" charset="0"/>
               <a:buChar char="•"/>
             </a:pPr>
-            <a:endParaRPr lang="en-US" dirty="0" smtClean="0">
+            <a:endParaRPr lang="en-US" sz="2000" dirty="0" smtClean="0">
               <a:solidFill>
                 <a:schemeClr val="tx1">
                   <a:lumMod val="85000"/>
@@ -8676,7 +8736,7 @@
               <a:buChar char="•"/>
             </a:pPr>
             <a:r>
-              <a:rPr lang="en-US" dirty="0" smtClean="0">
+              <a:rPr lang="en-US" sz="2000" dirty="0" smtClean="0">
                 <a:solidFill>
                   <a:schemeClr val="tx1">
                     <a:lumMod val="85000"/>
@@ -8691,7 +8751,7 @@
               <a:buFont typeface="Arial" panose="020B0604020202020204" pitchFamily="34" charset="0"/>
               <a:buChar char="•"/>
             </a:pPr>
-            <a:endParaRPr lang="en-US" dirty="0" smtClean="0">
+            <a:endParaRPr lang="en-US" sz="2000" dirty="0" smtClean="0">
               <a:solidFill>
                 <a:schemeClr val="tx1">
                   <a:lumMod val="85000"/>
@@ -8705,7 +8765,7 @@
               <a:buChar char="•"/>
             </a:pPr>
             <a:r>
-              <a:rPr lang="en-US" dirty="0" smtClean="0">
+              <a:rPr lang="en-US" sz="2000" dirty="0" smtClean="0">
                 <a:solidFill>
                   <a:schemeClr val="tx1">
                     <a:lumMod val="85000"/>
@@ -8720,7 +8780,7 @@
               <a:buFont typeface="Arial" panose="020B0604020202020204" pitchFamily="34" charset="0"/>
               <a:buChar char="•"/>
             </a:pPr>
-            <a:endParaRPr lang="en-US" dirty="0">
+            <a:endParaRPr lang="en-US" sz="2000" dirty="0">
               <a:solidFill>
                 <a:schemeClr val="tx1">
                   <a:lumMod val="85000"/>
@@ -8734,7 +8794,7 @@
               <a:buChar char="•"/>
             </a:pPr>
             <a:r>
-              <a:rPr lang="en-US" dirty="0" smtClean="0">
+              <a:rPr lang="en-US" sz="2000" dirty="0" smtClean="0">
                 <a:solidFill>
                   <a:schemeClr val="tx1">
                     <a:lumMod val="85000"/>
@@ -8744,7 +8804,7 @@
               <a:t>Configure </a:t>
             </a:r>
             <a:r>
-              <a:rPr lang="en-US" dirty="0" err="1" smtClean="0">
+              <a:rPr lang="en-US" sz="2000" dirty="0" err="1" smtClean="0">
                 <a:solidFill>
                   <a:schemeClr val="tx1">
                     <a:lumMod val="85000"/>
@@ -8754,7 +8814,7 @@
               <a:t>sudo</a:t>
             </a:r>
             <a:r>
-              <a:rPr lang="en-US" dirty="0" smtClean="0">
+              <a:rPr lang="en-US" sz="2000" dirty="0" smtClean="0">
                 <a:solidFill>
                   <a:schemeClr val="tx1">
                     <a:lumMod val="85000"/>
@@ -8765,7 +8825,7 @@
             </a:r>
           </a:p>
           <a:p>
-            <a:endParaRPr lang="en-US" dirty="0">
+            <a:endParaRPr lang="en-US" sz="2000" dirty="0">
               <a:solidFill>
                 <a:schemeClr val="tx1">
                   <a:lumMod val="85000"/>
@@ -8779,7 +8839,7 @@
               <a:buChar char="•"/>
             </a:pPr>
             <a:r>
-              <a:rPr lang="en-US" dirty="0" smtClean="0">
+              <a:rPr lang="en-US" sz="2000" dirty="0" smtClean="0">
                 <a:solidFill>
                   <a:schemeClr val="tx1">
                     <a:lumMod val="85000"/>
@@ -8794,7 +8854,7 @@
               <a:buFont typeface="Arial" panose="020B0604020202020204" pitchFamily="34" charset="0"/>
               <a:buChar char="•"/>
             </a:pPr>
-            <a:endParaRPr lang="en-US" dirty="0" smtClean="0">
+            <a:endParaRPr lang="en-US" sz="2000" dirty="0" smtClean="0">
               <a:solidFill>
                 <a:schemeClr val="tx1">
                   <a:lumMod val="85000"/>
@@ -8808,7 +8868,7 @@
               <a:buChar char="•"/>
             </a:pPr>
             <a:r>
-              <a:rPr lang="en-US" dirty="0" err="1" smtClean="0">
+              <a:rPr lang="en-US" sz="2000" dirty="0" err="1" smtClean="0">
                 <a:solidFill>
                   <a:schemeClr val="tx1">
                     <a:lumMod val="85000"/>
@@ -8818,7 +8878,7 @@
               <a:t>ssh</a:t>
             </a:r>
             <a:r>
-              <a:rPr lang="en-US" dirty="0" smtClean="0">
+              <a:rPr lang="en-US" sz="2000" dirty="0" smtClean="0">
                 <a:solidFill>
                   <a:schemeClr val="tx1">
                     <a:lumMod val="85000"/>
@@ -8930,7 +8990,7 @@
         <p:spPr>
           <a:xfrm>
             <a:off x="528569" y="1519676"/>
-            <a:ext cx="8001247" cy="4524315"/>
+            <a:ext cx="8001247" cy="3970318"/>
           </a:xfrm>
           <a:prstGeom prst="rect">
             <a:avLst/>
@@ -8948,7 +9008,7 @@
               <a:buChar char="•"/>
             </a:pPr>
             <a:r>
-              <a:rPr lang="en-US" dirty="0" smtClean="0">
+              <a:rPr lang="en-US" sz="2000" dirty="0" smtClean="0">
                 <a:solidFill>
                   <a:schemeClr val="tx1">
                     <a:lumMod val="85000"/>
@@ -8957,6 +9017,156 @@
               </a:rPr>
               <a:t>Trello</a:t>
             </a:r>
+          </a:p>
+          <a:p>
+            <a:pPr marL="285750" indent="-285750">
+              <a:buFont typeface="Arial" panose="020B0604020202020204" pitchFamily="34" charset="0"/>
+              <a:buChar char="•"/>
+            </a:pPr>
+            <a:endParaRPr lang="en-US" sz="2000" dirty="0" smtClean="0">
+              <a:solidFill>
+                <a:schemeClr val="tx1">
+                  <a:lumMod val="85000"/>
+                </a:schemeClr>
+              </a:solidFill>
+            </a:endParaRPr>
+          </a:p>
+          <a:p>
+            <a:pPr marL="285750" indent="-285750">
+              <a:buFont typeface="Arial" panose="020B0604020202020204" pitchFamily="34" charset="0"/>
+              <a:buChar char="•"/>
+            </a:pPr>
+            <a:r>
+              <a:rPr lang="en-US" sz="2000" dirty="0" err="1" smtClean="0">
+                <a:solidFill>
+                  <a:schemeClr val="tx1">
+                    <a:lumMod val="85000"/>
+                  </a:schemeClr>
+                </a:solidFill>
+              </a:rPr>
+              <a:t>Github</a:t>
+            </a:r>
+            <a:endParaRPr lang="en-US" sz="2000" dirty="0" smtClean="0">
+              <a:solidFill>
+                <a:schemeClr val="tx1">
+                  <a:lumMod val="85000"/>
+                </a:schemeClr>
+              </a:solidFill>
+            </a:endParaRPr>
+          </a:p>
+          <a:p>
+            <a:pPr marL="285750" indent="-285750">
+              <a:buFont typeface="Arial" panose="020B0604020202020204" pitchFamily="34" charset="0"/>
+              <a:buChar char="•"/>
+            </a:pPr>
+            <a:endParaRPr lang="en-US" sz="2000" dirty="0">
+              <a:solidFill>
+                <a:schemeClr val="tx1">
+                  <a:lumMod val="85000"/>
+                </a:schemeClr>
+              </a:solidFill>
+            </a:endParaRPr>
+          </a:p>
+          <a:p>
+            <a:pPr marL="285750" indent="-285750">
+              <a:buFont typeface="Arial" panose="020B0604020202020204" pitchFamily="34" charset="0"/>
+              <a:buChar char="•"/>
+            </a:pPr>
+            <a:r>
+              <a:rPr lang="en-US" sz="2000" dirty="0" err="1" smtClean="0">
+                <a:solidFill>
+                  <a:schemeClr val="tx1">
+                    <a:lumMod val="85000"/>
+                  </a:schemeClr>
+                </a:solidFill>
+              </a:rPr>
+              <a:t>Linpack</a:t>
+            </a:r>
+            <a:endParaRPr lang="en-US" sz="2000" dirty="0" smtClean="0">
+              <a:solidFill>
+                <a:schemeClr val="tx1">
+                  <a:lumMod val="85000"/>
+                </a:schemeClr>
+              </a:solidFill>
+            </a:endParaRPr>
+          </a:p>
+          <a:p>
+            <a:pPr marL="285750" indent="-285750">
+              <a:buFont typeface="Arial" panose="020B0604020202020204" pitchFamily="34" charset="0"/>
+              <a:buChar char="•"/>
+            </a:pPr>
+            <a:endParaRPr lang="en-US" sz="2000" dirty="0" smtClean="0">
+              <a:solidFill>
+                <a:schemeClr val="tx1">
+                  <a:lumMod val="85000"/>
+                </a:schemeClr>
+              </a:solidFill>
+            </a:endParaRPr>
+          </a:p>
+          <a:p>
+            <a:pPr marL="285750" indent="-285750">
+              <a:buFont typeface="Arial" panose="020B0604020202020204" pitchFamily="34" charset="0"/>
+              <a:buChar char="•"/>
+            </a:pPr>
+            <a:r>
+              <a:rPr lang="en-US" sz="2000" dirty="0" smtClean="0">
+                <a:solidFill>
+                  <a:schemeClr val="tx1">
+                    <a:lumMod val="85000"/>
+                  </a:schemeClr>
+                </a:solidFill>
+              </a:rPr>
+              <a:t>Screwdriver</a:t>
+            </a:r>
+          </a:p>
+          <a:p>
+            <a:pPr marL="285750" indent="-285750">
+              <a:buFont typeface="Arial" panose="020B0604020202020204" pitchFamily="34" charset="0"/>
+              <a:buChar char="•"/>
+            </a:pPr>
+            <a:endParaRPr lang="en-US" sz="2000" dirty="0">
+              <a:solidFill>
+                <a:schemeClr val="tx1">
+                  <a:lumMod val="85000"/>
+                </a:schemeClr>
+              </a:solidFill>
+            </a:endParaRPr>
+          </a:p>
+          <a:p>
+            <a:pPr marL="285750" indent="-285750">
+              <a:buFont typeface="Arial" panose="020B0604020202020204" pitchFamily="34" charset="0"/>
+              <a:buChar char="•"/>
+            </a:pPr>
+            <a:r>
+              <a:rPr lang="en-US" sz="2000" dirty="0" smtClean="0">
+                <a:solidFill>
+                  <a:schemeClr val="tx1">
+                    <a:lumMod val="85000"/>
+                  </a:schemeClr>
+                </a:solidFill>
+              </a:rPr>
+              <a:t>MPI</a:t>
+            </a:r>
+            <a:endParaRPr lang="en-US" dirty="0" smtClean="0">
+              <a:solidFill>
+                <a:schemeClr val="tx1">
+                  <a:lumMod val="85000"/>
+                </a:schemeClr>
+              </a:solidFill>
+            </a:endParaRPr>
+          </a:p>
+          <a:p>
+            <a:pPr marL="285750" indent="-285750">
+              <a:buFont typeface="Arial" panose="020B0604020202020204" pitchFamily="34" charset="0"/>
+              <a:buChar char="•"/>
+            </a:pPr>
+            <a:endParaRPr lang="en-US" dirty="0">
+              <a:solidFill>
+                <a:schemeClr val="tx1">
+                  <a:lumMod val="85000"/>
+                </a:schemeClr>
+              </a:solidFill>
+            </a:endParaRPr>
           </a:p>
           <a:p>
             <a:pPr marL="285750" indent="-285750">
@@ -8976,29 +9186,6 @@
               <a:buFont typeface="Arial" panose="020B0604020202020204" pitchFamily="34" charset="0"/>
               <a:buChar char="•"/>
             </a:pPr>
-            <a:r>
-              <a:rPr lang="en-US" dirty="0" err="1" smtClean="0">
-                <a:solidFill>
-                  <a:schemeClr val="tx1">
-                    <a:lumMod val="85000"/>
-                  </a:schemeClr>
-                </a:solidFill>
-              </a:rPr>
-              <a:t>Github</a:t>
-            </a:r>
-            <a:endParaRPr lang="en-US" dirty="0" smtClean="0">
-              <a:solidFill>
-                <a:schemeClr val="tx1">
-                  <a:lumMod val="85000"/>
-                </a:schemeClr>
-              </a:solidFill>
-            </a:endParaRPr>
-          </a:p>
-          <a:p>
-            <a:pPr marL="285750" indent="-285750">
-              <a:buFont typeface="Arial" panose="020B0604020202020204" pitchFamily="34" charset="0"/>
-              <a:buChar char="•"/>
-            </a:pPr>
             <a:endParaRPr lang="en-US" dirty="0">
               <a:solidFill>
                 <a:schemeClr val="tx1">
@@ -9012,17 +9199,7 @@
               <a:buFont typeface="Arial" panose="020B0604020202020204" pitchFamily="34" charset="0"/>
               <a:buChar char="•"/>
             </a:pPr>
-            <a:r>
-              <a:rPr lang="en-US" dirty="0" err="1" smtClean="0">
-                <a:solidFill>
-                  <a:schemeClr val="tx1">
-                    <a:lumMod val="85000"/>
-                  </a:schemeClr>
-                </a:solidFill>
-              </a:rPr>
-              <a:t>Linpack</a:t>
-            </a:r>
-            <a:endParaRPr lang="en-US" dirty="0" smtClean="0">
+            <a:endParaRPr lang="en-US" sz="2000" dirty="0">
               <a:solidFill>
                 <a:schemeClr val="tx1">
                   <a:lumMod val="85000"/>
@@ -9035,7 +9212,23 @@
               <a:buFont typeface="Arial" panose="020B0604020202020204" pitchFamily="34" charset="0"/>
               <a:buChar char="•"/>
             </a:pPr>
-            <a:endParaRPr lang="en-US" dirty="0" smtClean="0">
+            <a:r>
+              <a:rPr lang="en-US" sz="2000" dirty="0" smtClean="0">
+                <a:solidFill>
+                  <a:schemeClr val="tx1">
+                    <a:lumMod val="85000"/>
+                  </a:schemeClr>
+                </a:solidFill>
+              </a:rPr>
+              <a:t>Python</a:t>
+            </a:r>
+          </a:p>
+          <a:p>
+            <a:pPr marL="285750" indent="-285750">
+              <a:buFont typeface="Arial" panose="020B0604020202020204" pitchFamily="34" charset="0"/>
+              <a:buChar char="•"/>
+            </a:pPr>
+            <a:endParaRPr lang="en-US" sz="2000" dirty="0">
               <a:solidFill>
                 <a:schemeClr val="tx1">
                   <a:lumMod val="85000"/>
@@ -9049,14 +9242,14 @@
               <a:buChar char="•"/>
             </a:pPr>
             <a:r>
-              <a:rPr lang="en-US" dirty="0" smtClean="0">
+              <a:rPr lang="en-US" sz="2000" dirty="0" smtClean="0">
                 <a:solidFill>
                   <a:schemeClr val="tx1">
                     <a:lumMod val="85000"/>
                   </a:schemeClr>
                 </a:solidFill>
               </a:rPr>
-              <a:t>Screwdriver</a:t>
+              <a:t>C++</a:t>
             </a:r>
           </a:p>
           <a:p>
@@ -9064,7 +9257,7 @@
               <a:buFont typeface="Arial" panose="020B0604020202020204" pitchFamily="34" charset="0"/>
               <a:buChar char="•"/>
             </a:pPr>
-            <a:endParaRPr lang="en-US" dirty="0">
+            <a:endParaRPr lang="en-US" sz="2000" dirty="0">
               <a:solidFill>
                 <a:schemeClr val="tx1">
                   <a:lumMod val="85000"/>
@@ -9078,16 +9271,22 @@
               <a:buChar char="•"/>
             </a:pPr>
             <a:r>
-              <a:rPr lang="en-US" dirty="0" smtClean="0">
+              <a:rPr lang="en-US" sz="2000" dirty="0" smtClean="0">
                 <a:solidFill>
                   <a:schemeClr val="tx1">
                     <a:lumMod val="85000"/>
                   </a:schemeClr>
                 </a:solidFill>
               </a:rPr>
-              <a:t>MPI</a:t>
-            </a:r>
-            <a:endParaRPr lang="en-US" dirty="0" smtClean="0">
+              <a:t>Bash</a:t>
+            </a:r>
+          </a:p>
+          <a:p>
+            <a:pPr marL="285750" indent="-285750">
+              <a:buFont typeface="Arial" panose="020B0604020202020204" pitchFamily="34" charset="0"/>
+              <a:buChar char="•"/>
+            </a:pPr>
+            <a:endParaRPr lang="en-US" sz="2000" dirty="0">
               <a:solidFill>
                 <a:schemeClr val="tx1">
                   <a:lumMod val="85000"/>
@@ -9100,186 +9299,8 @@
               <a:buFont typeface="Arial" panose="020B0604020202020204" pitchFamily="34" charset="0"/>
               <a:buChar char="•"/>
             </a:pPr>
-            <a:endParaRPr lang="en-US" dirty="0" smtClean="0">
-              <a:solidFill>
-                <a:schemeClr val="tx1">
-                  <a:lumMod val="85000"/>
-                </a:schemeClr>
-              </a:solidFill>
-            </a:endParaRPr>
-          </a:p>
-          <a:p>
-            <a:pPr marL="285750" indent="-285750">
-              <a:buFont typeface="Arial" panose="020B0604020202020204" pitchFamily="34" charset="0"/>
-              <a:buChar char="•"/>
-            </a:pPr>
-            <a:endParaRPr lang="en-US" dirty="0">
-              <a:solidFill>
-                <a:schemeClr val="tx1">
-                  <a:lumMod val="85000"/>
-                </a:schemeClr>
-              </a:solidFill>
-            </a:endParaRPr>
-          </a:p>
-          <a:p>
-            <a:pPr marL="285750" indent="-285750">
-              <a:buFont typeface="Arial" panose="020B0604020202020204" pitchFamily="34" charset="0"/>
-              <a:buChar char="•"/>
-            </a:pPr>
-            <a:endParaRPr lang="en-US" dirty="0" smtClean="0">
-              <a:solidFill>
-                <a:schemeClr val="tx1">
-                  <a:lumMod val="85000"/>
-                </a:schemeClr>
-              </a:solidFill>
-            </a:endParaRPr>
-          </a:p>
-          <a:p>
-            <a:pPr marL="285750" indent="-285750">
-              <a:buFont typeface="Arial" panose="020B0604020202020204" pitchFamily="34" charset="0"/>
-              <a:buChar char="•"/>
-            </a:pPr>
-            <a:endParaRPr lang="en-US" dirty="0">
-              <a:solidFill>
-                <a:schemeClr val="tx1">
-                  <a:lumMod val="85000"/>
-                </a:schemeClr>
-              </a:solidFill>
-            </a:endParaRPr>
-          </a:p>
-          <a:p>
-            <a:pPr marL="285750" indent="-285750">
-              <a:buFont typeface="Arial" panose="020B0604020202020204" pitchFamily="34" charset="0"/>
-              <a:buChar char="•"/>
-            </a:pPr>
-            <a:endParaRPr lang="en-US" dirty="0" smtClean="0">
-              <a:solidFill>
-                <a:schemeClr val="tx1">
-                  <a:lumMod val="85000"/>
-                </a:schemeClr>
-              </a:solidFill>
-            </a:endParaRPr>
-          </a:p>
-          <a:p>
-            <a:pPr marL="285750" indent="-285750">
-              <a:buFont typeface="Arial" panose="020B0604020202020204" pitchFamily="34" charset="0"/>
-              <a:buChar char="•"/>
-            </a:pPr>
-            <a:endParaRPr lang="en-US" dirty="0">
-              <a:solidFill>
-                <a:schemeClr val="tx1">
-                  <a:lumMod val="85000"/>
-                </a:schemeClr>
-              </a:solidFill>
-            </a:endParaRPr>
-          </a:p>
-          <a:p>
-            <a:pPr marL="285750" indent="-285750">
-              <a:buFont typeface="Arial" panose="020B0604020202020204" pitchFamily="34" charset="0"/>
-              <a:buChar char="•"/>
-            </a:pPr>
-            <a:endParaRPr lang="en-US" dirty="0">
-              <a:solidFill>
-                <a:schemeClr val="tx1">
-                  <a:lumMod val="85000"/>
-                </a:schemeClr>
-              </a:solidFill>
-            </a:endParaRPr>
-          </a:p>
-          <a:p>
-            <a:pPr marL="285750" indent="-285750">
-              <a:buFont typeface="Arial" panose="020B0604020202020204" pitchFamily="34" charset="0"/>
-              <a:buChar char="•"/>
-            </a:pPr>
-            <a:r>
-              <a:rPr lang="en-US" dirty="0" smtClean="0">
-                <a:solidFill>
-                  <a:schemeClr val="tx1">
-                    <a:lumMod val="85000"/>
-                  </a:schemeClr>
-                </a:solidFill>
-              </a:rPr>
-              <a:t>Python</a:t>
-            </a:r>
-          </a:p>
-          <a:p>
-            <a:pPr marL="285750" indent="-285750">
-              <a:buFont typeface="Arial" panose="020B0604020202020204" pitchFamily="34" charset="0"/>
-              <a:buChar char="•"/>
-            </a:pPr>
-            <a:endParaRPr lang="en-US" dirty="0">
-              <a:solidFill>
-                <a:schemeClr val="tx1">
-                  <a:lumMod val="85000"/>
-                </a:schemeClr>
-              </a:solidFill>
-            </a:endParaRPr>
-          </a:p>
-          <a:p>
-            <a:pPr marL="285750" indent="-285750">
-              <a:buFont typeface="Arial" panose="020B0604020202020204" pitchFamily="34" charset="0"/>
-              <a:buChar char="•"/>
-            </a:pPr>
-            <a:r>
-              <a:rPr lang="en-US" dirty="0" smtClean="0">
-                <a:solidFill>
-                  <a:schemeClr val="tx1">
-                    <a:lumMod val="85000"/>
-                  </a:schemeClr>
-                </a:solidFill>
-              </a:rPr>
-              <a:t>C++</a:t>
-            </a:r>
-          </a:p>
-          <a:p>
-            <a:pPr marL="285750" indent="-285750">
-              <a:buFont typeface="Arial" panose="020B0604020202020204" pitchFamily="34" charset="0"/>
-              <a:buChar char="•"/>
-            </a:pPr>
-            <a:endParaRPr lang="en-US" dirty="0">
-              <a:solidFill>
-                <a:schemeClr val="tx1">
-                  <a:lumMod val="85000"/>
-                </a:schemeClr>
-              </a:solidFill>
-            </a:endParaRPr>
-          </a:p>
-          <a:p>
-            <a:pPr marL="285750" indent="-285750">
-              <a:buFont typeface="Arial" panose="020B0604020202020204" pitchFamily="34" charset="0"/>
-              <a:buChar char="•"/>
-            </a:pPr>
-            <a:r>
-              <a:rPr lang="en-US" dirty="0" smtClean="0">
-                <a:solidFill>
-                  <a:schemeClr val="tx1">
-                    <a:lumMod val="85000"/>
-                  </a:schemeClr>
-                </a:solidFill>
-              </a:rPr>
-              <a:t>Bash</a:t>
-            </a:r>
-          </a:p>
-          <a:p>
-            <a:pPr marL="285750" indent="-285750">
-              <a:buFont typeface="Arial" panose="020B0604020202020204" pitchFamily="34" charset="0"/>
-              <a:buChar char="•"/>
-            </a:pPr>
-            <a:endParaRPr lang="en-US" dirty="0">
-              <a:solidFill>
-                <a:schemeClr val="tx1">
-                  <a:lumMod val="85000"/>
-                </a:schemeClr>
-              </a:solidFill>
-            </a:endParaRPr>
-          </a:p>
-          <a:p>
-            <a:pPr marL="285750" indent="-285750">
-              <a:buFont typeface="Arial" panose="020B0604020202020204" pitchFamily="34" charset="0"/>
-              <a:buChar char="•"/>
-            </a:pPr>
-            <a:r>
-              <a:rPr lang="en-US" dirty="0" smtClean="0">
+            <a:r>
+              <a:rPr lang="en-US" sz="2000" dirty="0" smtClean="0">
                 <a:solidFill>
                   <a:schemeClr val="tx1">
                     <a:lumMod val="85000"/>
@@ -9378,7 +9399,7 @@
         <p:spPr>
           <a:xfrm>
             <a:off x="586935" y="2040634"/>
-            <a:ext cx="1906883" cy="3139321"/>
+            <a:ext cx="1906883" cy="3416320"/>
           </a:xfrm>
           <a:prstGeom prst="rect">
             <a:avLst/>
@@ -9396,7 +9417,7 @@
               <a:buChar char="•"/>
             </a:pPr>
             <a:r>
-              <a:rPr lang="en-US" dirty="0" smtClean="0">
+              <a:rPr lang="en-US" sz="2000" dirty="0" smtClean="0">
                 <a:solidFill>
                   <a:schemeClr val="tx1">
                     <a:lumMod val="85000"/>
@@ -9404,6 +9425,126 @@
                 </a:solidFill>
               </a:rPr>
               <a:t>Ping Pong</a:t>
+            </a:r>
+          </a:p>
+          <a:p>
+            <a:pPr marL="285750" indent="-285750">
+              <a:buFont typeface="Arial" panose="020B0604020202020204" pitchFamily="34" charset="0"/>
+              <a:buChar char="•"/>
+            </a:pPr>
+            <a:endParaRPr lang="en-US" sz="2000" dirty="0">
+              <a:solidFill>
+                <a:schemeClr val="tx1">
+                  <a:lumMod val="85000"/>
+                </a:schemeClr>
+              </a:solidFill>
+            </a:endParaRPr>
+          </a:p>
+          <a:p>
+            <a:pPr marL="285750" indent="-285750">
+              <a:buFont typeface="Arial" panose="020B0604020202020204" pitchFamily="34" charset="0"/>
+              <a:buChar char="•"/>
+            </a:pPr>
+            <a:endParaRPr lang="en-US" sz="2000" dirty="0" smtClean="0">
+              <a:solidFill>
+                <a:schemeClr val="tx1">
+                  <a:lumMod val="85000"/>
+                </a:schemeClr>
+              </a:solidFill>
+            </a:endParaRPr>
+          </a:p>
+          <a:p>
+            <a:pPr marL="285750" indent="-285750">
+              <a:buFont typeface="Arial" panose="020B0604020202020204" pitchFamily="34" charset="0"/>
+              <a:buChar char="•"/>
+            </a:pPr>
+            <a:r>
+              <a:rPr lang="en-US" sz="2000" dirty="0" smtClean="0">
+                <a:solidFill>
+                  <a:schemeClr val="tx1">
+                    <a:lumMod val="85000"/>
+                  </a:schemeClr>
+                </a:solidFill>
+              </a:rPr>
+              <a:t>LINPACK</a:t>
+            </a:r>
+            <a:endParaRPr lang="en-US" sz="2000" dirty="0" smtClean="0">
+              <a:solidFill>
+                <a:schemeClr val="tx1">
+                  <a:lumMod val="85000"/>
+                </a:schemeClr>
+              </a:solidFill>
+            </a:endParaRPr>
+          </a:p>
+          <a:p>
+            <a:pPr marL="285750" indent="-285750">
+              <a:buFont typeface="Arial" panose="020B0604020202020204" pitchFamily="34" charset="0"/>
+              <a:buChar char="•"/>
+            </a:pPr>
+            <a:endParaRPr lang="en-US" sz="2000" dirty="0">
+              <a:solidFill>
+                <a:schemeClr val="tx1">
+                  <a:lumMod val="85000"/>
+                </a:schemeClr>
+              </a:solidFill>
+            </a:endParaRPr>
+          </a:p>
+          <a:p>
+            <a:pPr marL="285750" indent="-285750">
+              <a:buFont typeface="Arial" panose="020B0604020202020204" pitchFamily="34" charset="0"/>
+              <a:buChar char="•"/>
+            </a:pPr>
+            <a:endParaRPr lang="en-US" sz="2000" dirty="0" smtClean="0">
+              <a:solidFill>
+                <a:schemeClr val="tx1">
+                  <a:lumMod val="85000"/>
+                </a:schemeClr>
+              </a:solidFill>
+            </a:endParaRPr>
+          </a:p>
+          <a:p>
+            <a:pPr marL="285750" indent="-285750">
+              <a:buFont typeface="Arial" panose="020B0604020202020204" pitchFamily="34" charset="0"/>
+              <a:buChar char="•"/>
+            </a:pPr>
+            <a:r>
+              <a:rPr lang="en-US" sz="2000" dirty="0" smtClean="0">
+                <a:solidFill>
+                  <a:schemeClr val="tx1">
+                    <a:lumMod val="85000"/>
+                  </a:schemeClr>
+                </a:solidFill>
+              </a:rPr>
+              <a:t>Hello</a:t>
+            </a:r>
+          </a:p>
+          <a:p>
+            <a:pPr marL="285750" indent="-285750">
+              <a:buFont typeface="Arial" panose="020B0604020202020204" pitchFamily="34" charset="0"/>
+              <a:buChar char="•"/>
+            </a:pPr>
+            <a:endParaRPr lang="en-US" sz="2000" dirty="0">
+              <a:solidFill>
+                <a:schemeClr val="tx1">
+                  <a:lumMod val="85000"/>
+                </a:schemeClr>
+              </a:solidFill>
+            </a:endParaRPr>
+          </a:p>
+          <a:p>
+            <a:pPr marL="285750" indent="-285750">
+              <a:buFont typeface="Arial" panose="020B0604020202020204" pitchFamily="34" charset="0"/>
+              <a:buChar char="•"/>
+            </a:pPr>
+            <a:r>
+              <a:rPr lang="en-US" sz="2000" dirty="0" smtClean="0">
+                <a:solidFill>
+                  <a:schemeClr val="tx1">
+                    <a:lumMod val="85000"/>
+                  </a:schemeClr>
+                </a:solidFill>
+              </a:rPr>
+              <a:t>Switch test</a:t>
             </a:r>
           </a:p>
           <a:p>
@@ -9424,126 +9565,6 @@
               <a:buFont typeface="Arial" panose="020B0604020202020204" pitchFamily="34" charset="0"/>
               <a:buChar char="•"/>
             </a:pPr>
-            <a:endParaRPr lang="en-US" dirty="0" smtClean="0">
-              <a:solidFill>
-                <a:schemeClr val="tx1">
-                  <a:lumMod val="85000"/>
-                </a:schemeClr>
-              </a:solidFill>
-            </a:endParaRPr>
-          </a:p>
-          <a:p>
-            <a:pPr marL="285750" indent="-285750">
-              <a:buFont typeface="Arial" panose="020B0604020202020204" pitchFamily="34" charset="0"/>
-              <a:buChar char="•"/>
-            </a:pPr>
-            <a:r>
-              <a:rPr lang="en-US" dirty="0" err="1" smtClean="0">
-                <a:solidFill>
-                  <a:schemeClr val="tx1">
-                    <a:lumMod val="85000"/>
-                  </a:schemeClr>
-                </a:solidFill>
-              </a:rPr>
-              <a:t>Linpack</a:t>
-            </a:r>
-            <a:endParaRPr lang="en-US" dirty="0" smtClean="0">
-              <a:solidFill>
-                <a:schemeClr val="tx1">
-                  <a:lumMod val="85000"/>
-                </a:schemeClr>
-              </a:solidFill>
-            </a:endParaRPr>
-          </a:p>
-          <a:p>
-            <a:pPr marL="285750" indent="-285750">
-              <a:buFont typeface="Arial" panose="020B0604020202020204" pitchFamily="34" charset="0"/>
-              <a:buChar char="•"/>
-            </a:pPr>
-            <a:endParaRPr lang="en-US" dirty="0">
-              <a:solidFill>
-                <a:schemeClr val="tx1">
-                  <a:lumMod val="85000"/>
-                </a:schemeClr>
-              </a:solidFill>
-            </a:endParaRPr>
-          </a:p>
-          <a:p>
-            <a:pPr marL="285750" indent="-285750">
-              <a:buFont typeface="Arial" panose="020B0604020202020204" pitchFamily="34" charset="0"/>
-              <a:buChar char="•"/>
-            </a:pPr>
-            <a:endParaRPr lang="en-US" dirty="0" smtClean="0">
-              <a:solidFill>
-                <a:schemeClr val="tx1">
-                  <a:lumMod val="85000"/>
-                </a:schemeClr>
-              </a:solidFill>
-            </a:endParaRPr>
-          </a:p>
-          <a:p>
-            <a:pPr marL="285750" indent="-285750">
-              <a:buFont typeface="Arial" panose="020B0604020202020204" pitchFamily="34" charset="0"/>
-              <a:buChar char="•"/>
-            </a:pPr>
-            <a:r>
-              <a:rPr lang="en-US" dirty="0" smtClean="0">
-                <a:solidFill>
-                  <a:schemeClr val="tx1">
-                    <a:lumMod val="85000"/>
-                  </a:schemeClr>
-                </a:solidFill>
-              </a:rPr>
-              <a:t>Hello</a:t>
-            </a:r>
-          </a:p>
-          <a:p>
-            <a:pPr marL="285750" indent="-285750">
-              <a:buFont typeface="Arial" panose="020B0604020202020204" pitchFamily="34" charset="0"/>
-              <a:buChar char="•"/>
-            </a:pPr>
-            <a:endParaRPr lang="en-US" dirty="0">
-              <a:solidFill>
-                <a:schemeClr val="tx1">
-                  <a:lumMod val="85000"/>
-                </a:schemeClr>
-              </a:solidFill>
-            </a:endParaRPr>
-          </a:p>
-          <a:p>
-            <a:pPr marL="285750" indent="-285750">
-              <a:buFont typeface="Arial" panose="020B0604020202020204" pitchFamily="34" charset="0"/>
-              <a:buChar char="•"/>
-            </a:pPr>
-            <a:r>
-              <a:rPr lang="en-US" dirty="0" smtClean="0">
-                <a:solidFill>
-                  <a:schemeClr val="tx1">
-                    <a:lumMod val="85000"/>
-                  </a:schemeClr>
-                </a:solidFill>
-              </a:rPr>
-              <a:t>Switch test</a:t>
-            </a:r>
-          </a:p>
-          <a:p>
-            <a:pPr marL="285750" indent="-285750">
-              <a:buFont typeface="Arial" panose="020B0604020202020204" pitchFamily="34" charset="0"/>
-              <a:buChar char="•"/>
-            </a:pPr>
-            <a:endParaRPr lang="en-US" dirty="0">
-              <a:solidFill>
-                <a:schemeClr val="tx1">
-                  <a:lumMod val="85000"/>
-                </a:schemeClr>
-              </a:solidFill>
-            </a:endParaRPr>
-          </a:p>
-          <a:p>
-            <a:pPr marL="285750" indent="-285750">
-              <a:buFont typeface="Arial" panose="020B0604020202020204" pitchFamily="34" charset="0"/>
-              <a:buChar char="•"/>
-            </a:pPr>
             <a:endParaRPr lang="en-US" dirty="0">
               <a:solidFill>
                 <a:schemeClr val="tx1">
@@ -9879,8 +9900,8 @@
         </p:nvSpPr>
         <p:spPr>
           <a:xfrm>
-            <a:off x="2840030" y="2040634"/>
-            <a:ext cx="5961070" cy="2862322"/>
+            <a:off x="2871107" y="2040634"/>
+            <a:ext cx="6550155" cy="3139321"/>
           </a:xfrm>
           <a:prstGeom prst="rect">
             <a:avLst/>
@@ -9898,7 +9919,7 @@
               <a:buChar char="•"/>
             </a:pPr>
             <a:r>
-              <a:rPr lang="en-US" dirty="0" smtClean="0">
+              <a:rPr lang="en-US" sz="2000" dirty="0" smtClean="0">
                 <a:solidFill>
                   <a:schemeClr val="tx1">
                     <a:lumMod val="85000"/>
@@ -9913,7 +9934,7 @@
               <a:buFont typeface="Arial" panose="020B0604020202020204" pitchFamily="34" charset="0"/>
               <a:buChar char="•"/>
             </a:pPr>
-            <a:endParaRPr lang="en-US" dirty="0">
+            <a:endParaRPr lang="en-US" sz="2000" dirty="0">
               <a:solidFill>
                 <a:schemeClr val="tx1">
                   <a:lumMod val="85000"/>
@@ -9927,7 +9948,7 @@
               <a:buChar char="•"/>
             </a:pPr>
             <a:r>
-              <a:rPr lang="en-US" dirty="0" smtClean="0">
+              <a:rPr lang="en-US" sz="2000" dirty="0" smtClean="0">
                 <a:solidFill>
                   <a:schemeClr val="tx1">
                     <a:lumMod val="85000"/>
@@ -9942,7 +9963,7 @@
               <a:buFont typeface="Arial" panose="020B0604020202020204" pitchFamily="34" charset="0"/>
               <a:buChar char="•"/>
             </a:pPr>
-            <a:endParaRPr lang="en-US" dirty="0" smtClean="0">
+            <a:endParaRPr lang="en-US" sz="2000" dirty="0" smtClean="0">
               <a:solidFill>
                 <a:schemeClr val="tx1">
                   <a:lumMod val="85000"/>
@@ -9956,7 +9977,7 @@
               <a:buChar char="•"/>
             </a:pPr>
             <a:r>
-              <a:rPr lang="en-US" dirty="0" smtClean="0">
+              <a:rPr lang="en-US" sz="2000" dirty="0" smtClean="0">
                 <a:solidFill>
                   <a:schemeClr val="tx1">
                     <a:lumMod val="85000"/>
@@ -9971,7 +9992,7 @@
               <a:buFont typeface="Arial" panose="020B0604020202020204" pitchFamily="34" charset="0"/>
               <a:buChar char="•"/>
             </a:pPr>
-            <a:endParaRPr lang="en-US" dirty="0">
+            <a:endParaRPr lang="en-US" sz="2000" dirty="0">
               <a:solidFill>
                 <a:schemeClr val="tx1">
                   <a:lumMod val="85000"/>
@@ -9985,7 +10006,7 @@
               <a:buChar char="•"/>
             </a:pPr>
             <a:r>
-              <a:rPr lang="en-US" dirty="0" smtClean="0">
+              <a:rPr lang="en-US" sz="2000" dirty="0" smtClean="0">
                 <a:solidFill>
                   <a:schemeClr val="tx1">
                     <a:lumMod val="85000"/>
@@ -9994,7 +10015,7 @@
               </a:rPr>
               <a:t>Tests the network</a:t>
             </a:r>
-            <a:endParaRPr lang="en-US" dirty="0">
+            <a:endParaRPr lang="en-US" sz="2000" dirty="0">
               <a:solidFill>
                 <a:schemeClr val="tx1">
                   <a:lumMod val="85000"/>
@@ -10091,7 +10112,7 @@
         <p:spPr>
           <a:xfrm>
             <a:off x="586935" y="2021489"/>
-            <a:ext cx="8001247" cy="2585323"/>
+            <a:ext cx="8001247" cy="2831544"/>
           </a:xfrm>
           <a:prstGeom prst="rect">
             <a:avLst/>
@@ -10109,7 +10130,7 @@
               <a:buChar char="•"/>
             </a:pPr>
             <a:r>
-              <a:rPr lang="en-US" dirty="0" err="1" smtClean="0">
+              <a:rPr lang="en-US" sz="2000" dirty="0" err="1" smtClean="0">
                 <a:solidFill>
                   <a:schemeClr val="tx1">
                     <a:lumMod val="85000"/>
@@ -10118,13 +10139,126 @@
               </a:rPr>
               <a:t>Fstab</a:t>
             </a:r>
-            <a:endParaRPr lang="en-US" dirty="0" smtClean="0">
+            <a:endParaRPr lang="en-US" sz="2000" dirty="0" smtClean="0">
               <a:solidFill>
                 <a:schemeClr val="tx1">
                   <a:lumMod val="85000"/>
                 </a:schemeClr>
               </a:solidFill>
             </a:endParaRPr>
+          </a:p>
+          <a:p>
+            <a:pPr marL="285750" indent="-285750">
+              <a:buFont typeface="Arial" panose="020B0604020202020204" pitchFamily="34" charset="0"/>
+              <a:buChar char="•"/>
+            </a:pPr>
+            <a:endParaRPr lang="en-US" sz="2000" dirty="0">
+              <a:solidFill>
+                <a:schemeClr val="tx1">
+                  <a:lumMod val="85000"/>
+                </a:schemeClr>
+              </a:solidFill>
+            </a:endParaRPr>
+          </a:p>
+          <a:p>
+            <a:pPr marL="285750" indent="-285750">
+              <a:buFont typeface="Arial" panose="020B0604020202020204" pitchFamily="34" charset="0"/>
+              <a:buChar char="•"/>
+            </a:pPr>
+            <a:r>
+              <a:rPr lang="en-US" sz="2000" dirty="0" smtClean="0">
+                <a:solidFill>
+                  <a:schemeClr val="tx1">
+                    <a:lumMod val="85000"/>
+                  </a:schemeClr>
+                </a:solidFill>
+              </a:rPr>
+              <a:t>LINPACK</a:t>
+            </a:r>
+            <a:endParaRPr lang="en-US" sz="2000" dirty="0" smtClean="0">
+              <a:solidFill>
+                <a:schemeClr val="tx1">
+                  <a:lumMod val="85000"/>
+                </a:schemeClr>
+              </a:solidFill>
+            </a:endParaRPr>
+          </a:p>
+          <a:p>
+            <a:pPr marL="742950" lvl="1" indent="-285750">
+              <a:buFont typeface="Arial" panose="020B0604020202020204" pitchFamily="34" charset="0"/>
+              <a:buChar char="•"/>
+            </a:pPr>
+            <a:r>
+              <a:rPr lang="en-US" sz="2000" dirty="0" smtClean="0">
+                <a:solidFill>
+                  <a:schemeClr val="tx1">
+                    <a:lumMod val="85000"/>
+                  </a:schemeClr>
+                </a:solidFill>
+              </a:rPr>
+              <a:t>Building</a:t>
+            </a:r>
+          </a:p>
+          <a:p>
+            <a:pPr marL="742950" lvl="1" indent="-285750">
+              <a:buFont typeface="Arial" panose="020B0604020202020204" pitchFamily="34" charset="0"/>
+              <a:buChar char="•"/>
+            </a:pPr>
+            <a:r>
+              <a:rPr lang="en-US" sz="2000" dirty="0" smtClean="0">
+                <a:solidFill>
+                  <a:schemeClr val="tx1">
+                    <a:lumMod val="85000"/>
+                  </a:schemeClr>
+                </a:solidFill>
+              </a:rPr>
+              <a:t>Figuring it out</a:t>
+            </a:r>
+          </a:p>
+          <a:p>
+            <a:pPr marL="285750" indent="-285750">
+              <a:buFont typeface="Arial" panose="020B0604020202020204" pitchFamily="34" charset="0"/>
+              <a:buChar char="•"/>
+            </a:pPr>
+            <a:endParaRPr lang="en-US" sz="2000" dirty="0">
+              <a:solidFill>
+                <a:schemeClr val="tx1">
+                  <a:lumMod val="85000"/>
+                </a:schemeClr>
+              </a:solidFill>
+            </a:endParaRPr>
+          </a:p>
+          <a:p>
+            <a:pPr marL="285750" indent="-285750">
+              <a:buFont typeface="Arial" panose="020B0604020202020204" pitchFamily="34" charset="0"/>
+              <a:buChar char="•"/>
+            </a:pPr>
+            <a:r>
+              <a:rPr lang="en-US" sz="2000" dirty="0" smtClean="0">
+                <a:solidFill>
+                  <a:schemeClr val="tx1">
+                    <a:lumMod val="85000"/>
+                  </a:schemeClr>
+                </a:solidFill>
+              </a:rPr>
+              <a:t>Static Frying</a:t>
+            </a:r>
+          </a:p>
+          <a:p>
+            <a:pPr marL="742950" lvl="1" indent="-285750">
+              <a:buFont typeface="Arial" panose="020B0604020202020204" pitchFamily="34" charset="0"/>
+              <a:buChar char="•"/>
+            </a:pPr>
+            <a:r>
+              <a:rPr lang="en-US" sz="2000" dirty="0" smtClean="0">
+                <a:solidFill>
+                  <a:schemeClr val="tx1">
+                    <a:lumMod val="85000"/>
+                  </a:schemeClr>
+                </a:solidFill>
+              </a:rPr>
+              <a:t>Two broken</a:t>
+            </a:r>
           </a:p>
           <a:p>
             <a:pPr marL="285750" indent="-285750">
@@ -10139,124 +10273,11 @@
               </a:solidFill>
             </a:endParaRPr>
           </a:p>
-          <a:p>
-            <a:pPr marL="285750" indent="-285750">
-              <a:buFont typeface="Arial" panose="020B0604020202020204" pitchFamily="34" charset="0"/>
-              <a:buChar char="•"/>
-            </a:pPr>
-            <a:r>
-              <a:rPr lang="en-US" dirty="0" err="1" smtClean="0">
-                <a:solidFill>
-                  <a:schemeClr val="tx1">
-                    <a:lumMod val="85000"/>
-                  </a:schemeClr>
-                </a:solidFill>
-              </a:rPr>
-              <a:t>Linpack</a:t>
-            </a:r>
-            <a:endParaRPr lang="en-US" dirty="0" smtClean="0">
-              <a:solidFill>
-                <a:schemeClr val="tx1">
-                  <a:lumMod val="85000"/>
-                </a:schemeClr>
-              </a:solidFill>
-            </a:endParaRPr>
-          </a:p>
-          <a:p>
-            <a:pPr marL="742950" lvl="1" indent="-285750">
-              <a:buFont typeface="Arial" panose="020B0604020202020204" pitchFamily="34" charset="0"/>
-              <a:buChar char="•"/>
-            </a:pPr>
-            <a:r>
-              <a:rPr lang="en-US" dirty="0" smtClean="0">
-                <a:solidFill>
-                  <a:schemeClr val="tx1">
-                    <a:lumMod val="85000"/>
-                  </a:schemeClr>
-                </a:solidFill>
-              </a:rPr>
-              <a:t>Building</a:t>
-            </a:r>
-          </a:p>
-          <a:p>
-            <a:pPr marL="742950" lvl="1" indent="-285750">
-              <a:buFont typeface="Arial" panose="020B0604020202020204" pitchFamily="34" charset="0"/>
-              <a:buChar char="•"/>
-            </a:pPr>
-            <a:r>
-              <a:rPr lang="en-US" dirty="0" smtClean="0">
-                <a:solidFill>
-                  <a:schemeClr val="tx1">
-                    <a:lumMod val="85000"/>
-                  </a:schemeClr>
-                </a:solidFill>
-              </a:rPr>
-              <a:t>Figuring it out</a:t>
-            </a:r>
-          </a:p>
-          <a:p>
-            <a:pPr marL="285750" indent="-285750">
-              <a:buFont typeface="Arial" panose="020B0604020202020204" pitchFamily="34" charset="0"/>
-              <a:buChar char="•"/>
-            </a:pPr>
-            <a:endParaRPr lang="en-US" dirty="0">
-              <a:solidFill>
-                <a:schemeClr val="tx1">
-                  <a:lumMod val="85000"/>
-                </a:schemeClr>
-              </a:solidFill>
-            </a:endParaRPr>
-          </a:p>
-          <a:p>
-            <a:pPr marL="285750" indent="-285750">
-              <a:buFont typeface="Arial" panose="020B0604020202020204" pitchFamily="34" charset="0"/>
-              <a:buChar char="•"/>
-            </a:pPr>
-            <a:r>
-              <a:rPr lang="en-US" dirty="0" smtClean="0">
-                <a:solidFill>
-                  <a:schemeClr val="tx1">
-                    <a:lumMod val="85000"/>
-                  </a:schemeClr>
-                </a:solidFill>
-              </a:rPr>
-              <a:t>Static Frying</a:t>
-            </a:r>
-          </a:p>
-          <a:p>
-            <a:pPr marL="742950" lvl="1" indent="-285750">
-              <a:buFont typeface="Arial" panose="020B0604020202020204" pitchFamily="34" charset="0"/>
-              <a:buChar char="•"/>
-            </a:pPr>
-            <a:r>
-              <a:rPr lang="en-US" dirty="0" smtClean="0">
-                <a:solidFill>
-                  <a:schemeClr val="tx1">
-                    <a:lumMod val="85000"/>
-                  </a:schemeClr>
-                </a:solidFill>
-              </a:rPr>
-              <a:t>Two broken</a:t>
-            </a:r>
-          </a:p>
-          <a:p>
-            <a:pPr marL="285750" indent="-285750">
-              <a:buFont typeface="Arial" panose="020B0604020202020204" pitchFamily="34" charset="0"/>
-              <a:buChar char="•"/>
-            </a:pPr>
-            <a:endParaRPr lang="en-US" dirty="0">
-              <a:solidFill>
-                <a:schemeClr val="tx1">
-                  <a:lumMod val="85000"/>
-                </a:schemeClr>
-              </a:solidFill>
-            </a:endParaRPr>
-          </a:p>
         </p:txBody>
       </p:sp>
       <p:pic>
         <p:nvPicPr>
-          <p:cNvPr id="4" name="Picture 3"/>
+          <p:cNvPr id="5" name="Picture 4"/>
           <p:cNvPicPr>
             <a:picLocks noChangeAspect="1"/>
           </p:cNvPicPr>
@@ -10270,22 +10291,52 @@
               </a:ext>
             </a:extLst>
           </a:blip>
-          <a:srcRect t="22169" r="158" b="14859"/>
+          <a:srcRect l="19118" t="389"/>
           <a:stretch/>
         </p:blipFill>
         <p:spPr>
           <a:xfrm>
-            <a:off x="4076241" y="3829235"/>
-            <a:ext cx="2621384" cy="2936882"/>
+            <a:off x="4170753" y="2083951"/>
+            <a:ext cx="4417429" cy="3062689"/>
           </a:xfrm>
           <a:prstGeom prst="rect">
             <a:avLst/>
           </a:prstGeom>
+          <a:solidFill>
+            <a:srgbClr val="FFFFFF">
+              <a:shade val="85000"/>
+            </a:srgbClr>
+          </a:solidFill>
+          <a:ln w="88900" cap="sq">
+            <a:solidFill>
+              <a:srgbClr val="FFFFFF"/>
+            </a:solidFill>
+            <a:miter lim="800000"/>
+          </a:ln>
+          <a:effectLst>
+            <a:outerShdw blurRad="55000" dist="18000" dir="5400000" algn="tl" rotWithShape="0">
+              <a:srgbClr val="000000">
+                <a:alpha val="40000"/>
+              </a:srgbClr>
+            </a:outerShdw>
+          </a:effectLst>
+          <a:scene3d>
+            <a:camera prst="orthographicFront"/>
+            <a:lightRig rig="twoPt" dir="t">
+              <a:rot lat="0" lon="0" rev="7200000"/>
+            </a:lightRig>
+          </a:scene3d>
+          <a:sp3d>
+            <a:bevelT w="25400" h="19050"/>
+            <a:contourClr>
+              <a:srgbClr val="FFFFFF"/>
+            </a:contourClr>
+          </a:sp3d>
         </p:spPr>
       </p:pic>
       <p:pic>
         <p:nvPicPr>
-          <p:cNvPr id="5" name="Picture 4"/>
+          <p:cNvPr id="6" name="Picture 5"/>
           <p:cNvPicPr>
             <a:picLocks noChangeAspect="1"/>
           </p:cNvPicPr>
@@ -10299,17 +10350,47 @@
               </a:ext>
             </a:extLst>
           </a:blip>
-          <a:srcRect l="19118" t="389"/>
+          <a:srcRect t="12479" b="8205"/>
           <a:stretch/>
         </p:blipFill>
         <p:spPr>
           <a:xfrm>
-            <a:off x="6912620" y="251461"/>
-            <a:ext cx="4417429" cy="3062689"/>
+            <a:off x="9121335" y="1727879"/>
+            <a:ext cx="2679262" cy="3774831"/>
           </a:xfrm>
           <a:prstGeom prst="rect">
             <a:avLst/>
           </a:prstGeom>
+          <a:solidFill>
+            <a:srgbClr val="FFFFFF">
+              <a:shade val="85000"/>
+            </a:srgbClr>
+          </a:solidFill>
+          <a:ln w="88900" cap="sq">
+            <a:solidFill>
+              <a:srgbClr val="FFFFFF"/>
+            </a:solidFill>
+            <a:miter lim="800000"/>
+          </a:ln>
+          <a:effectLst>
+            <a:outerShdw blurRad="55000" dist="18000" dir="5400000" algn="tl" rotWithShape="0">
+              <a:srgbClr val="000000">
+                <a:alpha val="40000"/>
+              </a:srgbClr>
+            </a:outerShdw>
+          </a:effectLst>
+          <a:scene3d>
+            <a:camera prst="orthographicFront"/>
+            <a:lightRig rig="twoPt" dir="t">
+              <a:rot lat="0" lon="0" rev="7200000"/>
+            </a:lightRig>
+          </a:scene3d>
+          <a:sp3d>
+            <a:bevelT w="25400" h="19050"/>
+            <a:contourClr>
+              <a:srgbClr val="FFFFFF"/>
+            </a:contourClr>
+          </a:sp3d>
         </p:spPr>
       </p:pic>
     </p:spTree>

</xml_diff>

<commit_message>
Made changes to PowerPoint
</commit_message>
<xml_diff>
--- a/Documents/ClientPresent2.pptx
+++ b/Documents/ClientPresent2.pptx
@@ -7692,7 +7692,7 @@
         <p:spPr>
           <a:xfrm>
             <a:off x="636915" y="2021489"/>
-            <a:ext cx="8001247" cy="2862322"/>
+            <a:ext cx="8001247" cy="3693319"/>
           </a:xfrm>
           <a:prstGeom prst="rect">
             <a:avLst/>
@@ -7825,6 +7825,58 @@
               </a:rPr>
               <a:t>Product</a:t>
             </a:r>
+          </a:p>
+          <a:p>
+            <a:pPr marL="742950" lvl="1" indent="-285750">
+              <a:buFont typeface="Arial" panose="020B0604020202020204" pitchFamily="34" charset="0"/>
+              <a:buChar char="•"/>
+            </a:pPr>
+            <a:r>
+              <a:rPr lang="en-US" dirty="0" smtClean="0">
+                <a:solidFill>
+                  <a:schemeClr val="tx1">
+                    <a:lumMod val="85000"/>
+                  </a:schemeClr>
+                </a:solidFill>
+              </a:rPr>
+              <a:t>Abstract</a:t>
+            </a:r>
+          </a:p>
+          <a:p>
+            <a:pPr marL="742950" lvl="1" indent="-285750">
+              <a:buFont typeface="Arial" panose="020B0604020202020204" pitchFamily="34" charset="0"/>
+              <a:buChar char="•"/>
+            </a:pPr>
+            <a:endParaRPr lang="en-US" dirty="0">
+              <a:solidFill>
+                <a:schemeClr val="tx1">
+                  <a:lumMod val="85000"/>
+                </a:schemeClr>
+              </a:solidFill>
+            </a:endParaRPr>
+          </a:p>
+          <a:p>
+            <a:pPr marL="285750" indent="-285750">
+              <a:buFont typeface="Arial" panose="020B0604020202020204" pitchFamily="34" charset="0"/>
+              <a:buChar char="•"/>
+            </a:pPr>
+            <a:r>
+              <a:rPr lang="en-US" dirty="0" smtClean="0">
+                <a:solidFill>
+                  <a:schemeClr val="tx1">
+                    <a:lumMod val="85000"/>
+                  </a:schemeClr>
+                </a:solidFill>
+              </a:rPr>
+              <a:t>Research Symposium: 4/7/2016</a:t>
+            </a:r>
+            <a:endParaRPr lang="en-US" dirty="0" smtClean="0">
+              <a:solidFill>
+                <a:schemeClr val="tx1">
+                  <a:lumMod val="85000"/>
+                </a:schemeClr>
+              </a:solidFill>
+            </a:endParaRPr>
           </a:p>
           <a:p>
             <a:pPr marL="742950" lvl="1" indent="-285750">
@@ -8151,17 +8203,7 @@
                   </a:schemeClr>
                 </a:solidFill>
               </a:rPr>
-              <a:t>Fastest and most </a:t>
-            </a:r>
-            <a:r>
-              <a:rPr lang="en-US" dirty="0" smtClean="0">
-                <a:solidFill>
-                  <a:schemeClr val="tx1">
-                    <a:lumMod val="85000"/>
-                  </a:schemeClr>
-                </a:solidFill>
-              </a:rPr>
-              <a:t>efficient</a:t>
+              <a:t>Fastest and most efficient</a:t>
             </a:r>
             <a:endParaRPr lang="en-US" dirty="0">
               <a:solidFill>
@@ -8431,25 +8473,8 @@
                   </a:schemeClr>
                 </a:solidFill>
               </a:rPr>
-              <a:t>Snow White and the seven </a:t>
-            </a:r>
-            <a:r>
-              <a:rPr lang="en-US" dirty="0" smtClean="0">
-                <a:solidFill>
-                  <a:schemeClr val="tx1">
-                    <a:lumMod val="85000"/>
-                  </a:schemeClr>
-                </a:solidFill>
-              </a:rPr>
-              <a:t>dwarfs</a:t>
-            </a:r>
-            <a:endParaRPr lang="en-US" dirty="0" smtClean="0">
-              <a:solidFill>
-                <a:schemeClr val="tx1">
-                  <a:lumMod val="85000"/>
-                </a:schemeClr>
-              </a:solidFill>
-            </a:endParaRPr>
+              <a:t>Snow White and the seven dwarfs</a:t>
+            </a:r>
           </a:p>
           <a:p>
             <a:pPr marL="285750" indent="-285750">
@@ -8523,6 +8548,36 @@
           <a:prstGeom prst="rect">
             <a:avLst/>
           </a:prstGeom>
+          <a:solidFill>
+            <a:srgbClr val="FFFFFF">
+              <a:shade val="85000"/>
+            </a:srgbClr>
+          </a:solidFill>
+          <a:ln w="88900" cap="sq">
+            <a:solidFill>
+              <a:srgbClr val="FFFFFF"/>
+            </a:solidFill>
+            <a:miter lim="800000"/>
+          </a:ln>
+          <a:effectLst>
+            <a:outerShdw blurRad="55000" dist="18000" dir="5400000" algn="tl" rotWithShape="0">
+              <a:srgbClr val="000000">
+                <a:alpha val="40000"/>
+              </a:srgbClr>
+            </a:outerShdw>
+          </a:effectLst>
+          <a:scene3d>
+            <a:camera prst="orthographicFront"/>
+            <a:lightRig rig="twoPt" dir="t">
+              <a:rot lat="0" lon="0" rev="7200000"/>
+            </a:lightRig>
+          </a:scene3d>
+          <a:sp3d>
+            <a:bevelT w="25400" h="19050"/>
+            <a:contourClr>
+              <a:srgbClr val="FFFFFF"/>
+            </a:contourClr>
+          </a:sp3d>
         </p:spPr>
       </p:pic>
       <p:pic>
@@ -8552,6 +8607,36 @@
           <a:prstGeom prst="rect">
             <a:avLst/>
           </a:prstGeom>
+          <a:solidFill>
+            <a:srgbClr val="FFFFFF">
+              <a:shade val="85000"/>
+            </a:srgbClr>
+          </a:solidFill>
+          <a:ln w="88900" cap="sq">
+            <a:solidFill>
+              <a:srgbClr val="FFFFFF"/>
+            </a:solidFill>
+            <a:miter lim="800000"/>
+          </a:ln>
+          <a:effectLst>
+            <a:outerShdw blurRad="55000" dist="18000" dir="5400000" algn="tl" rotWithShape="0">
+              <a:srgbClr val="000000">
+                <a:alpha val="40000"/>
+              </a:srgbClr>
+            </a:outerShdw>
+          </a:effectLst>
+          <a:scene3d>
+            <a:camera prst="orthographicFront"/>
+            <a:lightRig rig="twoPt" dir="t">
+              <a:rot lat="0" lon="0" rev="7200000"/>
+            </a:lightRig>
+          </a:scene3d>
+          <a:sp3d>
+            <a:bevelT w="25400" h="19050"/>
+            <a:contourClr>
+              <a:srgbClr val="FFFFFF"/>
+            </a:contourClr>
+          </a:sp3d>
         </p:spPr>
       </p:pic>
       <p:sp>
@@ -8562,7 +8647,7 @@
         </p:nvSpPr>
         <p:spPr>
           <a:xfrm>
-            <a:off x="5947760" y="5280877"/>
+            <a:off x="5925326" y="5233776"/>
             <a:ext cx="1486304" cy="369332"/>
           </a:xfrm>
           <a:prstGeom prst="rect">
@@ -8604,7 +8689,7 @@
         </p:nvSpPr>
         <p:spPr>
           <a:xfrm>
-            <a:off x="5575893" y="3982436"/>
+            <a:off x="5674857" y="3947528"/>
             <a:ext cx="938077" cy="369332"/>
           </a:xfrm>
           <a:prstGeom prst="rect">
@@ -9342,14 +9427,14 @@
               <a:buChar char="•"/>
             </a:pPr>
             <a:r>
-              <a:rPr lang="en-US" dirty="0" err="1" smtClean="0">
+              <a:rPr lang="en-US" dirty="0" smtClean="0">
                 <a:solidFill>
                   <a:schemeClr val="tx1">
                     <a:lumMod val="85000"/>
                   </a:schemeClr>
                 </a:solidFill>
               </a:rPr>
-              <a:t>Linpack</a:t>
+              <a:t>LINPACK</a:t>
             </a:r>
             <a:endParaRPr lang="en-US" dirty="0" smtClean="0">
               <a:solidFill>
@@ -9760,14 +9845,14 @@
               <a:buChar char="•"/>
             </a:pPr>
             <a:r>
-              <a:rPr lang="en-US" dirty="0" err="1" smtClean="0">
+              <a:rPr lang="en-US" dirty="0" smtClean="0">
                 <a:solidFill>
                   <a:schemeClr val="tx1">
                     <a:lumMod val="85000"/>
                   </a:schemeClr>
                 </a:solidFill>
               </a:rPr>
-              <a:t>Linpack</a:t>
+              <a:t>LINPACK</a:t>
             </a:r>
             <a:endParaRPr lang="en-US" dirty="0" smtClean="0">
               <a:solidFill>
@@ -10413,7 +10498,7 @@
         <p:spPr>
           <a:xfrm>
             <a:off x="586935" y="2021489"/>
-            <a:ext cx="8001247" cy="2585323"/>
+            <a:ext cx="8001247" cy="3139321"/>
           </a:xfrm>
           <a:prstGeom prst="rect">
             <a:avLst/>
@@ -10467,14 +10552,14 @@
               <a:buChar char="•"/>
             </a:pPr>
             <a:r>
-              <a:rPr lang="en-US" dirty="0" err="1" smtClean="0">
+              <a:rPr lang="en-US" dirty="0" smtClean="0">
                 <a:solidFill>
                   <a:schemeClr val="tx1">
                     <a:lumMod val="85000"/>
                   </a:schemeClr>
                 </a:solidFill>
               </a:rPr>
-              <a:t>Linpack</a:t>
+              <a:t>LINPACK</a:t>
             </a:r>
             <a:endParaRPr lang="en-US" dirty="0" smtClean="0">
               <a:solidFill>
@@ -10558,8 +10643,54 @@
                   </a:schemeClr>
                 </a:solidFill>
               </a:rPr>
-              <a:t>Two broken</a:t>
-            </a:r>
+              <a:t>Two </a:t>
+            </a:r>
+            <a:r>
+              <a:rPr lang="en-US" dirty="0" smtClean="0">
+                <a:solidFill>
+                  <a:schemeClr val="tx1">
+                    <a:lumMod val="85000"/>
+                  </a:schemeClr>
+                </a:solidFill>
+              </a:rPr>
+              <a:t>broken</a:t>
+            </a:r>
+          </a:p>
+          <a:p>
+            <a:pPr marL="742950" lvl="1" indent="-285750">
+              <a:buFont typeface="Arial" panose="020B0604020202020204" pitchFamily="34" charset="0"/>
+              <a:buChar char="•"/>
+            </a:pPr>
+            <a:endParaRPr lang="en-US" dirty="0">
+              <a:solidFill>
+                <a:schemeClr val="tx1">
+                  <a:lumMod val="85000"/>
+                </a:schemeClr>
+              </a:solidFill>
+            </a:endParaRPr>
+          </a:p>
+          <a:p>
+            <a:pPr marL="285750" indent="-285750">
+              <a:buFont typeface="Arial" panose="020B0604020202020204" pitchFamily="34" charset="0"/>
+              <a:buChar char="•"/>
+            </a:pPr>
+            <a:r>
+              <a:rPr lang="en-US" dirty="0" smtClean="0">
+                <a:solidFill>
+                  <a:schemeClr val="tx1">
+                    <a:lumMod val="85000"/>
+                  </a:schemeClr>
+                </a:solidFill>
+              </a:rPr>
+              <a:t>Backorder</a:t>
+            </a:r>
+            <a:endParaRPr lang="en-US" dirty="0" smtClean="0">
+              <a:solidFill>
+                <a:schemeClr val="tx1">
+                  <a:lumMod val="85000"/>
+                </a:schemeClr>
+              </a:solidFill>
+            </a:endParaRPr>
           </a:p>
           <a:p>
             <a:pPr marL="285750" indent="-285750">
@@ -10597,12 +10728,42 @@
         </p:blipFill>
         <p:spPr>
           <a:xfrm>
-            <a:off x="4076241" y="3829235"/>
+            <a:off x="4170753" y="2122707"/>
             <a:ext cx="2621384" cy="2936882"/>
           </a:xfrm>
           <a:prstGeom prst="rect">
             <a:avLst/>
           </a:prstGeom>
+          <a:solidFill>
+            <a:srgbClr val="FFFFFF">
+              <a:shade val="85000"/>
+            </a:srgbClr>
+          </a:solidFill>
+          <a:ln w="88900" cap="sq">
+            <a:solidFill>
+              <a:srgbClr val="FFFFFF"/>
+            </a:solidFill>
+            <a:miter lim="800000"/>
+          </a:ln>
+          <a:effectLst>
+            <a:outerShdw blurRad="55000" dist="18000" dir="5400000" algn="tl" rotWithShape="0">
+              <a:srgbClr val="000000">
+                <a:alpha val="40000"/>
+              </a:srgbClr>
+            </a:outerShdw>
+          </a:effectLst>
+          <a:scene3d>
+            <a:camera prst="orthographicFront"/>
+            <a:lightRig rig="twoPt" dir="t">
+              <a:rot lat="0" lon="0" rev="7200000"/>
+            </a:lightRig>
+          </a:scene3d>
+          <a:sp3d>
+            <a:bevelT w="25400" h="19050"/>
+            <a:contourClr>
+              <a:srgbClr val="FFFFFF"/>
+            </a:contourClr>
+          </a:sp3d>
         </p:spPr>
       </p:pic>
       <p:pic>
@@ -10626,12 +10787,42 @@
         </p:blipFill>
         <p:spPr>
           <a:xfrm>
-            <a:off x="6912620" y="251461"/>
+            <a:off x="7324746" y="2059804"/>
             <a:ext cx="4417429" cy="3062689"/>
           </a:xfrm>
           <a:prstGeom prst="rect">
             <a:avLst/>
           </a:prstGeom>
+          <a:solidFill>
+            <a:srgbClr val="FFFFFF">
+              <a:shade val="85000"/>
+            </a:srgbClr>
+          </a:solidFill>
+          <a:ln w="88900" cap="sq">
+            <a:solidFill>
+              <a:srgbClr val="FFFFFF"/>
+            </a:solidFill>
+            <a:miter lim="800000"/>
+          </a:ln>
+          <a:effectLst>
+            <a:outerShdw blurRad="55000" dist="18000" dir="5400000" algn="tl" rotWithShape="0">
+              <a:srgbClr val="000000">
+                <a:alpha val="40000"/>
+              </a:srgbClr>
+            </a:outerShdw>
+          </a:effectLst>
+          <a:scene3d>
+            <a:camera prst="orthographicFront"/>
+            <a:lightRig rig="twoPt" dir="t">
+              <a:rot lat="0" lon="0" rev="7200000"/>
+            </a:lightRig>
+          </a:scene3d>
+          <a:sp3d>
+            <a:bevelT w="25400" h="19050"/>
+            <a:contourClr>
+              <a:srgbClr val="FFFFFF"/>
+            </a:contourClr>
+          </a:sp3d>
         </p:spPr>
       </p:pic>
     </p:spTree>

</xml_diff>

<commit_message>
Some more changes to ppt
</commit_message>
<xml_diff>
--- a/Documents/ClientPresent2.pptx
+++ b/Documents/ClientPresent2.pptx
@@ -787,7 +787,15 @@
           <a:p>
             <a:r>
               <a:rPr lang="en-US" dirty="0" smtClean="0"/>
-              <a:t>Christine</a:t>
+              <a:t>Christine // need to</a:t>
+            </a:r>
+            <a:r>
+              <a:rPr lang="en-US" baseline="0" dirty="0" smtClean="0"/>
+              <a:t> figure this out </a:t>
+            </a:r>
+            <a:r>
+              <a:rPr lang="en-US" baseline="0" smtClean="0"/>
+              <a:t>precisly</a:t>
             </a:r>
             <a:endParaRPr lang="en-US" dirty="0"/>
           </a:p>
@@ -7552,7 +7560,7 @@
         <p:spPr>
           <a:xfrm>
             <a:off x="636915" y="2021489"/>
-            <a:ext cx="8001247" cy="923330"/>
+            <a:ext cx="8001247" cy="2031325"/>
           </a:xfrm>
           <a:prstGeom prst="rect">
             <a:avLst/>
@@ -7606,7 +7614,75 @@
                   </a:schemeClr>
                 </a:solidFill>
               </a:rPr>
-              <a:t>Develop and benchmark a new communication</a:t>
+              <a:t>Develop and benchmark a new </a:t>
+            </a:r>
+            <a:r>
+              <a:rPr lang="en-US" dirty="0" smtClean="0">
+                <a:solidFill>
+                  <a:schemeClr val="tx1">
+                    <a:lumMod val="85000"/>
+                  </a:schemeClr>
+                </a:solidFill>
+              </a:rPr>
+              <a:t>communication</a:t>
+            </a:r>
+          </a:p>
+          <a:p>
+            <a:pPr marL="285750" indent="-285750">
+              <a:buFont typeface="Arial" panose="020B0604020202020204" pitchFamily="34" charset="0"/>
+              <a:buChar char="•"/>
+            </a:pPr>
+            <a:endParaRPr lang="en-US" dirty="0">
+              <a:solidFill>
+                <a:schemeClr val="tx1">
+                  <a:lumMod val="85000"/>
+                </a:schemeClr>
+              </a:solidFill>
+            </a:endParaRPr>
+          </a:p>
+          <a:p>
+            <a:pPr marL="285750" indent="-285750">
+              <a:buFont typeface="Arial" panose="020B0604020202020204" pitchFamily="34" charset="0"/>
+              <a:buChar char="•"/>
+            </a:pPr>
+            <a:r>
+              <a:rPr lang="en-US" dirty="0" smtClean="0">
+                <a:solidFill>
+                  <a:schemeClr val="tx1">
+                    <a:lumMod val="85000"/>
+                  </a:schemeClr>
+                </a:solidFill>
+              </a:rPr>
+              <a:t>Research Symposium</a:t>
+            </a:r>
+          </a:p>
+          <a:p>
+            <a:pPr marL="285750" indent="-285750">
+              <a:buFont typeface="Arial" panose="020B0604020202020204" pitchFamily="34" charset="0"/>
+              <a:buChar char="•"/>
+            </a:pPr>
+            <a:endParaRPr lang="en-US" dirty="0">
+              <a:solidFill>
+                <a:schemeClr val="tx1">
+                  <a:lumMod val="85000"/>
+                </a:schemeClr>
+              </a:solidFill>
+            </a:endParaRPr>
+          </a:p>
+          <a:p>
+            <a:pPr marL="285750" indent="-285750">
+              <a:buFont typeface="Arial" panose="020B0604020202020204" pitchFamily="34" charset="0"/>
+              <a:buChar char="•"/>
+            </a:pPr>
+            <a:r>
+              <a:rPr lang="en-US" dirty="0" smtClean="0">
+                <a:solidFill>
+                  <a:schemeClr val="tx1">
+                    <a:lumMod val="85000"/>
+                  </a:schemeClr>
+                </a:solidFill>
+              </a:rPr>
+              <a:t>Design Fair</a:t>
             </a:r>
             <a:endParaRPr lang="en-US" dirty="0">
               <a:solidFill>
@@ -7692,7 +7768,7 @@
         <p:spPr>
           <a:xfrm>
             <a:off x="636915" y="2021489"/>
-            <a:ext cx="8001247" cy="3693319"/>
+            <a:ext cx="8001247" cy="3970318"/>
           </a:xfrm>
           <a:prstGeom prst="rect">
             <a:avLst/>
@@ -7733,8 +7809,31 @@
                   </a:schemeClr>
                 </a:solidFill>
               </a:rPr>
+              <a:t>Research</a:t>
+            </a:r>
+          </a:p>
+          <a:p>
+            <a:pPr marL="742950" lvl="1" indent="-285750">
+              <a:buFont typeface="Arial" panose="020B0604020202020204" pitchFamily="34" charset="0"/>
+              <a:buChar char="•"/>
+            </a:pPr>
+            <a:r>
+              <a:rPr lang="en-US" dirty="0" smtClean="0">
+                <a:solidFill>
+                  <a:schemeClr val="tx1">
+                    <a:lumMod val="85000"/>
+                  </a:schemeClr>
+                </a:solidFill>
+              </a:rPr>
               <a:t>Prototype</a:t>
             </a:r>
+            <a:endParaRPr lang="en-US" dirty="0" smtClean="0">
+              <a:solidFill>
+                <a:schemeClr val="tx1">
+                  <a:lumMod val="85000"/>
+                </a:schemeClr>
+              </a:solidFill>
+            </a:endParaRPr>
           </a:p>
           <a:p>
             <a:pPr marL="285750" indent="-285750">
@@ -7762,8 +7861,35 @@
                   </a:schemeClr>
                 </a:solidFill>
               </a:rPr>
-              <a:t>Sprint 5: 2/15/16-3/4/16</a:t>
-            </a:r>
+              <a:t>Sprint 5</a:t>
+            </a:r>
+            <a:r>
+              <a:rPr lang="en-US" smtClean="0">
+                <a:solidFill>
+                  <a:schemeClr val="tx1">
+                    <a:lumMod val="85000"/>
+                  </a:schemeClr>
+                </a:solidFill>
+              </a:rPr>
+              <a:t>: </a:t>
+            </a:r>
+            <a:r>
+              <a:rPr lang="en-US" smtClean="0">
+                <a:solidFill>
+                  <a:schemeClr val="tx1">
+                    <a:lumMod val="85000"/>
+                  </a:schemeClr>
+                </a:solidFill>
+              </a:rPr>
+              <a:t>2/15/16-3/4/16</a:t>
+            </a:r>
+            <a:endParaRPr lang="en-US" dirty="0" smtClean="0">
+              <a:solidFill>
+                <a:schemeClr val="tx1">
+                  <a:lumMod val="85000"/>
+                </a:schemeClr>
+              </a:solidFill>
+            </a:endParaRPr>
           </a:p>
           <a:p>
             <a:pPr marL="742950" lvl="1" indent="-285750">
@@ -7778,8 +7904,15 @@
                   </a:schemeClr>
                 </a:solidFill>
               </a:rPr>
-              <a:t>Presentation</a:t>
-            </a:r>
+              <a:t>Benchmark</a:t>
+            </a:r>
+            <a:endParaRPr lang="en-US" dirty="0" smtClean="0">
+              <a:solidFill>
+                <a:schemeClr val="tx1">
+                  <a:lumMod val="85000"/>
+                </a:schemeClr>
+              </a:solidFill>
+            </a:endParaRPr>
           </a:p>
           <a:p>
             <a:pPr marL="742950" lvl="1" indent="-285750">
@@ -7870,13 +8003,6 @@
               </a:rPr>
               <a:t>Research Symposium: 4/7/2016</a:t>
             </a:r>
-            <a:endParaRPr lang="en-US" dirty="0" smtClean="0">
-              <a:solidFill>
-                <a:schemeClr val="tx1">
-                  <a:lumMod val="85000"/>
-                </a:schemeClr>
-              </a:solidFill>
-            </a:endParaRPr>
           </a:p>
           <a:p>
             <a:pPr marL="742950" lvl="1" indent="-285750">
@@ -9436,13 +9562,6 @@
               </a:rPr>
               <a:t>LINPACK</a:t>
             </a:r>
-            <a:endParaRPr lang="en-US" dirty="0" smtClean="0">
-              <a:solidFill>
-                <a:schemeClr val="tx1">
-                  <a:lumMod val="85000"/>
-                </a:schemeClr>
-              </a:solidFill>
-            </a:endParaRPr>
           </a:p>
           <a:p>
             <a:pPr marL="285750" indent="-285750">
@@ -9854,13 +9973,6 @@
               </a:rPr>
               <a:t>LINPACK</a:t>
             </a:r>
-            <a:endParaRPr lang="en-US" dirty="0" smtClean="0">
-              <a:solidFill>
-                <a:schemeClr val="tx1">
-                  <a:lumMod val="85000"/>
-                </a:schemeClr>
-              </a:solidFill>
-            </a:endParaRPr>
           </a:p>
           <a:p>
             <a:pPr marL="285750" indent="-285750">
@@ -10561,13 +10673,6 @@
               </a:rPr>
               <a:t>LINPACK</a:t>
             </a:r>
-            <a:endParaRPr lang="en-US" dirty="0" smtClean="0">
-              <a:solidFill>
-                <a:schemeClr val="tx1">
-                  <a:lumMod val="85000"/>
-                </a:schemeClr>
-              </a:solidFill>
-            </a:endParaRPr>
           </a:p>
           <a:p>
             <a:pPr marL="742950" lvl="1" indent="-285750">
@@ -10643,17 +10748,7 @@
                   </a:schemeClr>
                 </a:solidFill>
               </a:rPr>
-              <a:t>Two </a:t>
-            </a:r>
-            <a:r>
-              <a:rPr lang="en-US" dirty="0" smtClean="0">
-                <a:solidFill>
-                  <a:schemeClr val="tx1">
-                    <a:lumMod val="85000"/>
-                  </a:schemeClr>
-                </a:solidFill>
-              </a:rPr>
-              <a:t>broken</a:t>
+              <a:t>Two broken</a:t>
             </a:r>
           </a:p>
           <a:p>
@@ -10684,13 +10779,6 @@
               </a:rPr>
               <a:t>Backorder</a:t>
             </a:r>
-            <a:endParaRPr lang="en-US" dirty="0" smtClean="0">
-              <a:solidFill>
-                <a:schemeClr val="tx1">
-                  <a:lumMod val="85000"/>
-                </a:schemeClr>
-              </a:solidFill>
-            </a:endParaRPr>
           </a:p>
           <a:p>
             <a:pPr marL="285750" indent="-285750">

</xml_diff>

<commit_message>
Updates after today's practice
</commit_message>
<xml_diff>
--- a/Documents/ClientPresent2.pptx
+++ b/Documents/ClientPresent2.pptx
@@ -981,7 +981,11 @@
           <a:p>
             <a:r>
               <a:rPr lang="en-US" dirty="0" smtClean="0"/>
-              <a:t>Sam</a:t>
+              <a:t>Sam //include star</a:t>
+            </a:r>
+            <a:r>
+              <a:rPr lang="en-US" baseline="0" dirty="0" smtClean="0"/>
+              <a:t> model</a:t>
             </a:r>
             <a:endParaRPr lang="en-US" dirty="0"/>
           </a:p>
@@ -1333,7 +1337,7 @@
           <a:p>
             <a:r>
               <a:rPr lang="en-US" dirty="0" smtClean="0"/>
-              <a:t>Andrew</a:t>
+              <a:t>Andrew //Christine other protocols</a:t>
             </a:r>
             <a:endParaRPr lang="en-US" dirty="0"/>
           </a:p>
@@ -7232,8 +7236,8 @@
         </p:nvSpPr>
         <p:spPr>
           <a:xfrm>
-            <a:off x="528569" y="1830961"/>
-            <a:ext cx="8001247" cy="3970318"/>
+            <a:off x="446507" y="1502715"/>
+            <a:ext cx="8001247" cy="4801314"/>
           </a:xfrm>
           <a:prstGeom prst="rect">
             <a:avLst/>
@@ -7241,7 +7245,7 @@
           <a:noFill/>
         </p:spPr>
         <p:txBody>
-          <a:bodyPr wrap="square" rtlCol="0">
+          <a:bodyPr wrap="square" numCol="2" rtlCol="0">
             <a:spAutoFit/>
           </a:bodyPr>
           <a:lstStyle/>
@@ -7274,8 +7278,25 @@
                   </a:schemeClr>
                 </a:solidFill>
               </a:rPr>
-              <a:t>(1) $</a:t>
-            </a:r>
+              <a:t>(1) </a:t>
+            </a:r>
+            <a:r>
+              <a:rPr lang="en-US" dirty="0" smtClean="0">
+                <a:solidFill>
+                  <a:schemeClr val="tx1">
+                    <a:lumMod val="85000"/>
+                  </a:schemeClr>
+                </a:solidFill>
+              </a:rPr>
+              <a:t>$39.99</a:t>
+            </a:r>
+            <a:endParaRPr lang="en-US" dirty="0" smtClean="0">
+              <a:solidFill>
+                <a:schemeClr val="tx1">
+                  <a:lumMod val="85000"/>
+                </a:schemeClr>
+              </a:solidFill>
+            </a:endParaRPr>
           </a:p>
           <a:p>
             <a:pPr marL="285750" indent="-285750">
@@ -7319,17 +7340,62 @@
                   </a:schemeClr>
                 </a:solidFill>
               </a:rPr>
-              <a:t>(8) 1’  $2.99 </a:t>
-            </a:r>
-            <a:r>
-              <a:rPr lang="en-US" smtClean="0">
+              <a:t>(8) 1’  $2.99 each </a:t>
+            </a:r>
+          </a:p>
+          <a:p>
+            <a:pPr marL="742950" lvl="1" indent="-285750">
+              <a:buFont typeface="Arial" panose="020B0604020202020204" pitchFamily="34" charset="0"/>
+              <a:buChar char="•"/>
+            </a:pPr>
+            <a:endParaRPr lang="en-US" dirty="0">
+              <a:solidFill>
+                <a:schemeClr val="tx1">
+                  <a:lumMod val="85000"/>
+                </a:schemeClr>
+              </a:solidFill>
+            </a:endParaRPr>
+          </a:p>
+          <a:p>
+            <a:pPr marL="285750" indent="-285750">
+              <a:buFont typeface="Arial" panose="020B0604020202020204" pitchFamily="34" charset="0"/>
+              <a:buChar char="•"/>
+            </a:pPr>
+            <a:r>
+              <a:rPr lang="en-US" dirty="0" smtClean="0">
                 <a:solidFill>
                   <a:schemeClr val="tx1">
                     <a:lumMod val="85000"/>
                   </a:schemeClr>
                 </a:solidFill>
               </a:rPr>
-              <a:t>each </a:t>
+              <a:t>Power Unit</a:t>
+            </a:r>
+          </a:p>
+          <a:p>
+            <a:pPr marL="742950" lvl="1" indent="-285750">
+              <a:buFont typeface="Arial" panose="020B0604020202020204" pitchFamily="34" charset="0"/>
+              <a:buChar char="•"/>
+            </a:pPr>
+            <a:r>
+              <a:rPr lang="en-US" dirty="0" smtClean="0">
+                <a:solidFill>
+                  <a:schemeClr val="tx1">
+                    <a:lumMod val="85000"/>
+                  </a:schemeClr>
+                </a:solidFill>
+              </a:rPr>
+              <a:t>(1) </a:t>
+            </a:r>
+            <a:r>
+              <a:rPr lang="en-US" dirty="0" smtClean="0">
+                <a:solidFill>
+                  <a:schemeClr val="tx1">
+                    <a:lumMod val="85000"/>
+                  </a:schemeClr>
+                </a:solidFill>
+              </a:rPr>
+              <a:t>$49.99</a:t>
             </a:r>
             <a:endParaRPr lang="en-US" dirty="0" smtClean="0">
               <a:solidFill>
@@ -7338,51 +7404,6 @@
                 </a:schemeClr>
               </a:solidFill>
             </a:endParaRPr>
-          </a:p>
-          <a:p>
-            <a:pPr marL="742950" lvl="1" indent="-285750">
-              <a:buFont typeface="Arial" panose="020B0604020202020204" pitchFamily="34" charset="0"/>
-              <a:buChar char="•"/>
-            </a:pPr>
-            <a:endParaRPr lang="en-US" dirty="0">
-              <a:solidFill>
-                <a:schemeClr val="tx1">
-                  <a:lumMod val="85000"/>
-                </a:schemeClr>
-              </a:solidFill>
-            </a:endParaRPr>
-          </a:p>
-          <a:p>
-            <a:pPr marL="285750" indent="-285750">
-              <a:buFont typeface="Arial" panose="020B0604020202020204" pitchFamily="34" charset="0"/>
-              <a:buChar char="•"/>
-            </a:pPr>
-            <a:r>
-              <a:rPr lang="en-US" dirty="0" smtClean="0">
-                <a:solidFill>
-                  <a:schemeClr val="tx1">
-                    <a:lumMod val="85000"/>
-                  </a:schemeClr>
-                </a:solidFill>
-              </a:rPr>
-              <a:t>Power Unit</a:t>
-            </a:r>
-          </a:p>
-          <a:p>
-            <a:pPr marL="742950" lvl="1" indent="-285750">
-              <a:buFont typeface="Arial" panose="020B0604020202020204" pitchFamily="34" charset="0"/>
-              <a:buChar char="•"/>
-            </a:pPr>
-            <a:r>
-              <a:rPr lang="en-US" dirty="0" smtClean="0">
-                <a:solidFill>
-                  <a:schemeClr val="tx1">
-                    <a:lumMod val="85000"/>
-                  </a:schemeClr>
-                </a:solidFill>
-              </a:rPr>
-              <a:t>(1) $</a:t>
-            </a:r>
           </a:p>
           <a:p>
             <a:pPr lvl="1"/>
@@ -7444,26 +7465,6 @@
               <a:buFont typeface="Arial" panose="020B0604020202020204" pitchFamily="34" charset="0"/>
               <a:buChar char="•"/>
             </a:pPr>
-            <a:r>
-              <a:rPr lang="en-US" dirty="0" smtClean="0">
-                <a:solidFill>
-                  <a:schemeClr val="tx1">
-                    <a:lumMod val="85000"/>
-                  </a:schemeClr>
-                </a:solidFill>
-              </a:rPr>
-              <a:t>ODROID </a:t>
-            </a:r>
-            <a:r>
-              <a:rPr lang="en-US" dirty="0" smtClean="0">
-                <a:solidFill>
-                  <a:schemeClr val="tx1">
-                    <a:lumMod val="85000"/>
-                  </a:schemeClr>
-                </a:solidFill>
-              </a:rPr>
-              <a:t>Ux4</a:t>
-            </a:r>
             <a:endParaRPr lang="en-US" dirty="0" smtClean="0">
               <a:solidFill>
                 <a:schemeClr val="tx1">
@@ -7473,6 +7474,84 @@
             </a:endParaRPr>
           </a:p>
           <a:p>
+            <a:pPr marL="285750" indent="-285750">
+              <a:buFont typeface="Arial" panose="020B0604020202020204" pitchFamily="34" charset="0"/>
+              <a:buChar char="•"/>
+            </a:pPr>
+            <a:endParaRPr lang="en-US" dirty="0">
+              <a:solidFill>
+                <a:schemeClr val="tx1">
+                  <a:lumMod val="85000"/>
+                </a:schemeClr>
+              </a:solidFill>
+            </a:endParaRPr>
+          </a:p>
+          <a:p>
+            <a:pPr marL="285750" indent="-285750">
+              <a:buFont typeface="Arial" panose="020B0604020202020204" pitchFamily="34" charset="0"/>
+              <a:buChar char="•"/>
+            </a:pPr>
+            <a:endParaRPr lang="en-US" dirty="0" smtClean="0">
+              <a:solidFill>
+                <a:schemeClr val="tx1">
+                  <a:lumMod val="85000"/>
+                </a:schemeClr>
+              </a:solidFill>
+            </a:endParaRPr>
+          </a:p>
+          <a:p>
+            <a:pPr marL="285750" indent="-285750">
+              <a:buFont typeface="Arial" panose="020B0604020202020204" pitchFamily="34" charset="0"/>
+              <a:buChar char="•"/>
+            </a:pPr>
+            <a:endParaRPr lang="en-US" dirty="0">
+              <a:solidFill>
+                <a:schemeClr val="tx1">
+                  <a:lumMod val="85000"/>
+                </a:schemeClr>
+              </a:solidFill>
+            </a:endParaRPr>
+          </a:p>
+          <a:p>
+            <a:pPr marL="285750" indent="-285750">
+              <a:buFont typeface="Arial" panose="020B0604020202020204" pitchFamily="34" charset="0"/>
+              <a:buChar char="•"/>
+            </a:pPr>
+            <a:endParaRPr lang="en-US" dirty="0" smtClean="0">
+              <a:solidFill>
+                <a:schemeClr val="tx1">
+                  <a:lumMod val="85000"/>
+                </a:schemeClr>
+              </a:solidFill>
+            </a:endParaRPr>
+          </a:p>
+          <a:p>
+            <a:pPr marL="285750" indent="-285750">
+              <a:buFont typeface="Arial" panose="020B0604020202020204" pitchFamily="34" charset="0"/>
+              <a:buChar char="•"/>
+            </a:pPr>
+            <a:r>
+              <a:rPr lang="en-US" dirty="0" smtClean="0">
+                <a:solidFill>
+                  <a:schemeClr val="tx1">
+                    <a:lumMod val="85000"/>
+                  </a:schemeClr>
+                </a:solidFill>
+              </a:rPr>
+              <a:t>ODROID </a:t>
+            </a:r>
+            <a:r>
+              <a:rPr lang="en-US" dirty="0" smtClean="0">
+                <a:solidFill>
+                  <a:schemeClr val="tx1">
+                    <a:lumMod val="85000"/>
+                  </a:schemeClr>
+                </a:solidFill>
+              </a:rPr>
+              <a:t>Ux4</a:t>
+            </a:r>
+          </a:p>
+          <a:p>
             <a:pPr marL="742950" lvl="1" indent="-285750">
               <a:buFont typeface="Arial" panose="020B0604020202020204" pitchFamily="34" charset="0"/>
               <a:buChar char="•"/>
@@ -7485,7 +7564,162 @@
                   </a:schemeClr>
                 </a:solidFill>
               </a:rPr>
-              <a:t>(8) $76.00 each</a:t>
+              <a:t>(8) $76.00 </a:t>
+            </a:r>
+            <a:r>
+              <a:rPr lang="en-US" dirty="0" smtClean="0">
+                <a:solidFill>
+                  <a:schemeClr val="tx1">
+                    <a:lumMod val="85000"/>
+                  </a:schemeClr>
+                </a:solidFill>
+              </a:rPr>
+              <a:t>each</a:t>
+            </a:r>
+          </a:p>
+          <a:p>
+            <a:pPr marL="742950" lvl="1" indent="-285750">
+              <a:buFont typeface="Arial" panose="020B0604020202020204" pitchFamily="34" charset="0"/>
+              <a:buChar char="•"/>
+            </a:pPr>
+            <a:endParaRPr lang="en-US" dirty="0">
+              <a:solidFill>
+                <a:schemeClr val="tx1">
+                  <a:lumMod val="85000"/>
+                </a:schemeClr>
+              </a:solidFill>
+            </a:endParaRPr>
+          </a:p>
+          <a:p>
+            <a:pPr marL="285750" indent="-285750">
+              <a:buFont typeface="Arial" panose="020B0604020202020204" pitchFamily="34" charset="0"/>
+              <a:buChar char="•"/>
+            </a:pPr>
+            <a:r>
+              <a:rPr lang="en-US" dirty="0" smtClean="0">
+                <a:solidFill>
+                  <a:schemeClr val="tx1">
+                    <a:lumMod val="85000"/>
+                  </a:schemeClr>
+                </a:solidFill>
+              </a:rPr>
+              <a:t>Replacement ODROID Ux4</a:t>
+            </a:r>
+          </a:p>
+          <a:p>
+            <a:pPr marL="742950" lvl="1" indent="-285750">
+              <a:buFont typeface="Arial" panose="020B0604020202020204" pitchFamily="34" charset="0"/>
+              <a:buChar char="•"/>
+            </a:pPr>
+            <a:r>
+              <a:rPr lang="en-US" dirty="0" smtClean="0">
+                <a:solidFill>
+                  <a:schemeClr val="tx1">
+                    <a:lumMod val="85000"/>
+                  </a:schemeClr>
+                </a:solidFill>
+              </a:rPr>
+              <a:t>(2) $76.00 each</a:t>
+            </a:r>
+          </a:p>
+          <a:p>
+            <a:pPr marL="742950" lvl="1" indent="-285750">
+              <a:buFont typeface="Arial" panose="020B0604020202020204" pitchFamily="34" charset="0"/>
+              <a:buChar char="•"/>
+            </a:pPr>
+            <a:endParaRPr lang="en-US" dirty="0">
+              <a:solidFill>
+                <a:schemeClr val="tx1">
+                  <a:lumMod val="85000"/>
+                </a:schemeClr>
+              </a:solidFill>
+            </a:endParaRPr>
+          </a:p>
+          <a:p>
+            <a:pPr marL="285750" indent="-285750">
+              <a:buFont typeface="Arial" panose="020B0604020202020204" pitchFamily="34" charset="0"/>
+              <a:buChar char="•"/>
+            </a:pPr>
+            <a:r>
+              <a:rPr lang="en-US" dirty="0" smtClean="0">
+                <a:solidFill>
+                  <a:schemeClr val="tx1">
+                    <a:lumMod val="85000"/>
+                  </a:schemeClr>
+                </a:solidFill>
+              </a:rPr>
+              <a:t>Acrylic board</a:t>
+            </a:r>
+          </a:p>
+          <a:p>
+            <a:pPr marL="742950" lvl="1" indent="-285750">
+              <a:buFont typeface="Arial" panose="020B0604020202020204" pitchFamily="34" charset="0"/>
+              <a:buChar char="•"/>
+            </a:pPr>
+            <a:r>
+              <a:rPr lang="en-US" dirty="0" smtClean="0">
+                <a:solidFill>
+                  <a:schemeClr val="tx1">
+                    <a:lumMod val="85000"/>
+                  </a:schemeClr>
+                </a:solidFill>
+              </a:rPr>
+              <a:t>(1) $25.00</a:t>
+            </a:r>
+          </a:p>
+          <a:p>
+            <a:pPr marL="742950" lvl="1" indent="-285750">
+              <a:buFont typeface="Arial" panose="020B0604020202020204" pitchFamily="34" charset="0"/>
+              <a:buChar char="•"/>
+            </a:pPr>
+            <a:endParaRPr lang="en-US" dirty="0">
+              <a:solidFill>
+                <a:schemeClr val="tx1">
+                  <a:lumMod val="85000"/>
+                </a:schemeClr>
+              </a:solidFill>
+            </a:endParaRPr>
+          </a:p>
+          <a:p>
+            <a:pPr marL="285750" indent="-285750">
+              <a:buFont typeface="Arial" panose="020B0604020202020204" pitchFamily="34" charset="0"/>
+              <a:buChar char="•"/>
+            </a:pPr>
+            <a:r>
+              <a:rPr lang="en-US" dirty="0" err="1" smtClean="0">
+                <a:solidFill>
+                  <a:schemeClr val="tx1">
+                    <a:lumMod val="85000"/>
+                  </a:schemeClr>
+                </a:solidFill>
+              </a:rPr>
+              <a:t>Miscellanous</a:t>
+            </a:r>
+            <a:r>
+              <a:rPr lang="en-US" dirty="0" smtClean="0">
+                <a:solidFill>
+                  <a:schemeClr val="tx1">
+                    <a:lumMod val="85000"/>
+                  </a:schemeClr>
+                </a:solidFill>
+              </a:rPr>
+              <a:t> </a:t>
+            </a:r>
+          </a:p>
+          <a:p>
+            <a:pPr marL="742950" lvl="1" indent="-285750">
+              <a:buFont typeface="Arial" panose="020B0604020202020204" pitchFamily="34" charset="0"/>
+              <a:buChar char="•"/>
+            </a:pPr>
+            <a:r>
+              <a:rPr lang="en-US" dirty="0" smtClean="0">
+                <a:solidFill>
+                  <a:schemeClr val="tx1">
+                    <a:lumMod val="85000"/>
+                  </a:schemeClr>
+                </a:solidFill>
+              </a:rPr>
+              <a:t>$25.00</a:t>
             </a:r>
             <a:endParaRPr lang="en-US" dirty="0">
               <a:solidFill>
@@ -7934,13 +8168,6 @@
               </a:rPr>
               <a:t>Product</a:t>
             </a:r>
-            <a:endParaRPr lang="en-US" dirty="0" smtClean="0">
-              <a:solidFill>
-                <a:schemeClr val="tx1">
-                  <a:lumMod val="85000"/>
-                </a:schemeClr>
-              </a:solidFill>
-            </a:endParaRPr>
           </a:p>
           <a:p>
             <a:pPr marL="742950" lvl="1" indent="-285750">
@@ -9531,6 +9758,69 @@
             </a:r>
           </a:p>
           <a:p>
+            <a:endParaRPr lang="en-US" dirty="0">
+              <a:solidFill>
+                <a:schemeClr val="tx1">
+                  <a:lumMod val="85000"/>
+                </a:schemeClr>
+              </a:solidFill>
+            </a:endParaRPr>
+          </a:p>
+          <a:p>
+            <a:pPr marL="285750" indent="-285750">
+              <a:buFont typeface="Arial" panose="020B0604020202020204" pitchFamily="34" charset="0"/>
+              <a:buChar char="•"/>
+            </a:pPr>
+            <a:r>
+              <a:rPr lang="en-US" dirty="0" smtClean="0">
+                <a:solidFill>
+                  <a:schemeClr val="tx1">
+                    <a:lumMod val="85000"/>
+                  </a:schemeClr>
+                </a:solidFill>
+              </a:rPr>
+              <a:t>MPI</a:t>
+            </a:r>
+          </a:p>
+          <a:p>
+            <a:endParaRPr lang="en-US" dirty="0">
+              <a:solidFill>
+                <a:schemeClr val="tx1">
+                  <a:lumMod val="85000"/>
+                </a:schemeClr>
+              </a:solidFill>
+            </a:endParaRPr>
+          </a:p>
+          <a:p>
+            <a:pPr marL="285750" indent="-285750">
+              <a:buFont typeface="Arial" panose="020B0604020202020204" pitchFamily="34" charset="0"/>
+              <a:buChar char="•"/>
+            </a:pPr>
+            <a:r>
+              <a:rPr lang="en-US" dirty="0" smtClean="0">
+                <a:solidFill>
+                  <a:schemeClr val="tx1">
+                    <a:lumMod val="85000"/>
+                  </a:schemeClr>
+                </a:solidFill>
+              </a:rPr>
+              <a:t>Python</a:t>
+            </a:r>
+          </a:p>
+          <a:p>
+            <a:pPr marL="285750" indent="-285750">
+              <a:buFont typeface="Arial" panose="020B0604020202020204" pitchFamily="34" charset="0"/>
+              <a:buChar char="•"/>
+            </a:pPr>
+            <a:endParaRPr lang="en-US" dirty="0">
+              <a:solidFill>
+                <a:schemeClr val="tx1">
+                  <a:lumMod val="85000"/>
+                </a:schemeClr>
+              </a:solidFill>
+            </a:endParaRPr>
+          </a:p>
+          <a:p>
             <a:pPr marL="285750" indent="-285750">
               <a:buFont typeface="Arial" panose="020B0604020202020204" pitchFamily="34" charset="0"/>
               <a:buChar char="•"/>
@@ -9548,22 +9838,6 @@
               <a:buFont typeface="Arial" panose="020B0604020202020204" pitchFamily="34" charset="0"/>
               <a:buChar char="•"/>
             </a:pPr>
-            <a:r>
-              <a:rPr lang="en-US" dirty="0" smtClean="0">
-                <a:solidFill>
-                  <a:schemeClr val="tx1">
-                    <a:lumMod val="85000"/>
-                  </a:schemeClr>
-                </a:solidFill>
-              </a:rPr>
-              <a:t>Screwdriver</a:t>
-            </a:r>
-          </a:p>
-          <a:p>
-            <a:pPr marL="285750" indent="-285750">
-              <a:buFont typeface="Arial" panose="020B0604020202020204" pitchFamily="34" charset="0"/>
-              <a:buChar char="•"/>
-            </a:pPr>
             <a:endParaRPr lang="en-US" dirty="0">
               <a:solidFill>
                 <a:schemeClr val="tx1">
@@ -9577,22 +9851,6 @@
               <a:buFont typeface="Arial" panose="020B0604020202020204" pitchFamily="34" charset="0"/>
               <a:buChar char="•"/>
             </a:pPr>
-            <a:r>
-              <a:rPr lang="en-US" dirty="0" smtClean="0">
-                <a:solidFill>
-                  <a:schemeClr val="tx1">
-                    <a:lumMod val="85000"/>
-                  </a:schemeClr>
-                </a:solidFill>
-              </a:rPr>
-              <a:t>MPI</a:t>
-            </a:r>
-          </a:p>
-          <a:p>
-            <a:pPr marL="285750" indent="-285750">
-              <a:buFont typeface="Arial" panose="020B0604020202020204" pitchFamily="34" charset="0"/>
-              <a:buChar char="•"/>
-            </a:pPr>
             <a:endParaRPr lang="en-US" dirty="0" smtClean="0">
               <a:solidFill>
                 <a:schemeClr val="tx1">
@@ -9645,6 +9903,113 @@
               <a:buFont typeface="Arial" panose="020B0604020202020204" pitchFamily="34" charset="0"/>
               <a:buChar char="•"/>
             </a:pPr>
+            <a:r>
+              <a:rPr lang="en-US" dirty="0" smtClean="0">
+                <a:solidFill>
+                  <a:schemeClr val="tx1">
+                    <a:lumMod val="85000"/>
+                  </a:schemeClr>
+                </a:solidFill>
+              </a:rPr>
+              <a:t>C</a:t>
+            </a:r>
+            <a:r>
+              <a:rPr lang="en-US" dirty="0" smtClean="0">
+                <a:solidFill>
+                  <a:schemeClr val="tx1">
+                    <a:lumMod val="85000"/>
+                  </a:schemeClr>
+                </a:solidFill>
+              </a:rPr>
+              <a:t>++</a:t>
+            </a:r>
+          </a:p>
+          <a:p>
+            <a:pPr marL="285750" indent="-285750">
+              <a:buFont typeface="Arial" panose="020B0604020202020204" pitchFamily="34" charset="0"/>
+              <a:buChar char="•"/>
+            </a:pPr>
+            <a:endParaRPr lang="en-US" dirty="0">
+              <a:solidFill>
+                <a:schemeClr val="tx1">
+                  <a:lumMod val="85000"/>
+                </a:schemeClr>
+              </a:solidFill>
+            </a:endParaRPr>
+          </a:p>
+          <a:p>
+            <a:pPr marL="285750" indent="-285750">
+              <a:buFont typeface="Arial" panose="020B0604020202020204" pitchFamily="34" charset="0"/>
+              <a:buChar char="•"/>
+            </a:pPr>
+            <a:r>
+              <a:rPr lang="en-US" dirty="0" smtClean="0">
+                <a:solidFill>
+                  <a:schemeClr val="tx1">
+                    <a:lumMod val="85000"/>
+                  </a:schemeClr>
+                </a:solidFill>
+              </a:rPr>
+              <a:t>Bash</a:t>
+            </a:r>
+          </a:p>
+          <a:p>
+            <a:pPr marL="285750" indent="-285750">
+              <a:buFont typeface="Arial" panose="020B0604020202020204" pitchFamily="34" charset="0"/>
+              <a:buChar char="•"/>
+            </a:pPr>
+            <a:endParaRPr lang="en-US" dirty="0">
+              <a:solidFill>
+                <a:schemeClr val="tx1">
+                  <a:lumMod val="85000"/>
+                </a:schemeClr>
+              </a:solidFill>
+            </a:endParaRPr>
+          </a:p>
+          <a:p>
+            <a:pPr marL="285750" indent="-285750">
+              <a:buFont typeface="Arial" panose="020B0604020202020204" pitchFamily="34" charset="0"/>
+              <a:buChar char="•"/>
+            </a:pPr>
+            <a:r>
+              <a:rPr lang="en-US" dirty="0" smtClean="0">
+                <a:solidFill>
+                  <a:schemeClr val="tx1">
+                    <a:lumMod val="85000"/>
+                  </a:schemeClr>
+                </a:solidFill>
+              </a:rPr>
+              <a:t>Linux</a:t>
+            </a:r>
+          </a:p>
+          <a:p>
+            <a:pPr marL="285750" indent="-285750">
+              <a:buFont typeface="Arial" panose="020B0604020202020204" pitchFamily="34" charset="0"/>
+              <a:buChar char="•"/>
+            </a:pPr>
+            <a:endParaRPr lang="en-US" dirty="0">
+              <a:solidFill>
+                <a:schemeClr val="tx1">
+                  <a:lumMod val="85000"/>
+                </a:schemeClr>
+              </a:solidFill>
+            </a:endParaRPr>
+          </a:p>
+          <a:p>
+            <a:pPr marL="285750" indent="-285750">
+              <a:buFont typeface="Arial" panose="020B0604020202020204" pitchFamily="34" charset="0"/>
+              <a:buChar char="•"/>
+            </a:pPr>
+            <a:r>
+              <a:rPr lang="en-US" dirty="0" smtClean="0">
+                <a:solidFill>
+                  <a:schemeClr val="tx1">
+                    <a:lumMod val="85000"/>
+                  </a:schemeClr>
+                </a:solidFill>
+              </a:rPr>
+              <a:t>Screwdriver</a:t>
+            </a:r>
             <a:endParaRPr lang="en-US" dirty="0" smtClean="0">
               <a:solidFill>
                 <a:schemeClr val="tx1">
@@ -9652,135 +10017,6 @@
                 </a:schemeClr>
               </a:solidFill>
             </a:endParaRPr>
-          </a:p>
-          <a:p>
-            <a:pPr marL="285750" indent="-285750">
-              <a:buFont typeface="Arial" panose="020B0604020202020204" pitchFamily="34" charset="0"/>
-              <a:buChar char="•"/>
-            </a:pPr>
-            <a:endParaRPr lang="en-US" dirty="0">
-              <a:solidFill>
-                <a:schemeClr val="tx1">
-                  <a:lumMod val="85000"/>
-                </a:schemeClr>
-              </a:solidFill>
-            </a:endParaRPr>
-          </a:p>
-          <a:p>
-            <a:pPr marL="285750" indent="-285750">
-              <a:buFont typeface="Arial" panose="020B0604020202020204" pitchFamily="34" charset="0"/>
-              <a:buChar char="•"/>
-            </a:pPr>
-            <a:endParaRPr lang="en-US" dirty="0">
-              <a:solidFill>
-                <a:schemeClr val="tx1">
-                  <a:lumMod val="85000"/>
-                </a:schemeClr>
-              </a:solidFill>
-            </a:endParaRPr>
-          </a:p>
-          <a:p>
-            <a:pPr marL="285750" indent="-285750">
-              <a:buFont typeface="Arial" panose="020B0604020202020204" pitchFamily="34" charset="0"/>
-              <a:buChar char="•"/>
-            </a:pPr>
-            <a:r>
-              <a:rPr lang="en-US" dirty="0" smtClean="0">
-                <a:solidFill>
-                  <a:schemeClr val="tx1">
-                    <a:lumMod val="85000"/>
-                  </a:schemeClr>
-                </a:solidFill>
-              </a:rPr>
-              <a:t>Python</a:t>
-            </a:r>
-          </a:p>
-          <a:p>
-            <a:pPr marL="285750" indent="-285750">
-              <a:buFont typeface="Arial" panose="020B0604020202020204" pitchFamily="34" charset="0"/>
-              <a:buChar char="•"/>
-            </a:pPr>
-            <a:endParaRPr lang="en-US" dirty="0">
-              <a:solidFill>
-                <a:schemeClr val="tx1">
-                  <a:lumMod val="85000"/>
-                </a:schemeClr>
-              </a:solidFill>
-            </a:endParaRPr>
-          </a:p>
-          <a:p>
-            <a:pPr marL="285750" indent="-285750">
-              <a:buFont typeface="Arial" panose="020B0604020202020204" pitchFamily="34" charset="0"/>
-              <a:buChar char="•"/>
-            </a:pPr>
-            <a:r>
-              <a:rPr lang="en-US" dirty="0" smtClean="0">
-                <a:solidFill>
-                  <a:schemeClr val="tx1">
-                    <a:lumMod val="85000"/>
-                  </a:schemeClr>
-                </a:solidFill>
-              </a:rPr>
-              <a:t>C++</a:t>
-            </a:r>
-          </a:p>
-          <a:p>
-            <a:pPr marL="285750" indent="-285750">
-              <a:buFont typeface="Arial" panose="020B0604020202020204" pitchFamily="34" charset="0"/>
-              <a:buChar char="•"/>
-            </a:pPr>
-            <a:endParaRPr lang="en-US" dirty="0">
-              <a:solidFill>
-                <a:schemeClr val="tx1">
-                  <a:lumMod val="85000"/>
-                </a:schemeClr>
-              </a:solidFill>
-            </a:endParaRPr>
-          </a:p>
-          <a:p>
-            <a:pPr marL="285750" indent="-285750">
-              <a:buFont typeface="Arial" panose="020B0604020202020204" pitchFamily="34" charset="0"/>
-              <a:buChar char="•"/>
-            </a:pPr>
-            <a:r>
-              <a:rPr lang="en-US" dirty="0" smtClean="0">
-                <a:solidFill>
-                  <a:schemeClr val="tx1">
-                    <a:lumMod val="85000"/>
-                  </a:schemeClr>
-                </a:solidFill>
-              </a:rPr>
-              <a:t>Bash</a:t>
-            </a:r>
-          </a:p>
-          <a:p>
-            <a:pPr marL="285750" indent="-285750">
-              <a:buFont typeface="Arial" panose="020B0604020202020204" pitchFamily="34" charset="0"/>
-              <a:buChar char="•"/>
-            </a:pPr>
-            <a:endParaRPr lang="en-US" dirty="0">
-              <a:solidFill>
-                <a:schemeClr val="tx1">
-                  <a:lumMod val="85000"/>
-                </a:schemeClr>
-              </a:solidFill>
-            </a:endParaRPr>
-          </a:p>
-          <a:p>
-            <a:pPr marL="285750" indent="-285750">
-              <a:buFont typeface="Arial" panose="020B0604020202020204" pitchFamily="34" charset="0"/>
-              <a:buChar char="•"/>
-            </a:pPr>
-            <a:r>
-              <a:rPr lang="en-US" dirty="0" smtClean="0">
-                <a:solidFill>
-                  <a:schemeClr val="tx1">
-                    <a:lumMod val="85000"/>
-                  </a:schemeClr>
-                </a:solidFill>
-              </a:rPr>
-              <a:t>Linux</a:t>
-            </a:r>
           </a:p>
           <a:p>
             <a:pPr marL="285750" indent="-285750">
@@ -9871,7 +10107,7 @@
         <p:spPr>
           <a:xfrm>
             <a:off x="586935" y="2040634"/>
-            <a:ext cx="1906883" cy="3139321"/>
+            <a:ext cx="1906883" cy="2308324"/>
           </a:xfrm>
           <a:prstGeom prst="rect">
             <a:avLst/>
@@ -9896,14 +10132,18 @@
                   </a:schemeClr>
                 </a:solidFill>
               </a:rPr>
-              <a:t>Ping Pong</a:t>
-            </a:r>
-          </a:p>
-          <a:p>
-            <a:pPr marL="285750" indent="-285750">
-              <a:buFont typeface="Arial" panose="020B0604020202020204" pitchFamily="34" charset="0"/>
-              <a:buChar char="•"/>
-            </a:pPr>
+              <a:t>Ping </a:t>
+            </a:r>
+            <a:r>
+              <a:rPr lang="en-US" dirty="0" smtClean="0">
+                <a:solidFill>
+                  <a:schemeClr val="tx1">
+                    <a:lumMod val="85000"/>
+                  </a:schemeClr>
+                </a:solidFill>
+              </a:rPr>
+              <a:t>Pong</a:t>
+            </a:r>
             <a:endParaRPr lang="en-US" dirty="0">
               <a:solidFill>
                 <a:schemeClr val="tx1">
@@ -9930,6 +10170,19 @@
               <a:buFont typeface="Arial" panose="020B0604020202020204" pitchFamily="34" charset="0"/>
               <a:buChar char="•"/>
             </a:pPr>
+            <a:endParaRPr lang="en-US" dirty="0" smtClean="0">
+              <a:solidFill>
+                <a:schemeClr val="tx1">
+                  <a:lumMod val="85000"/>
+                </a:schemeClr>
+              </a:solidFill>
+            </a:endParaRPr>
+          </a:p>
+          <a:p>
+            <a:pPr marL="285750" indent="-285750">
+              <a:buFont typeface="Arial" panose="020B0604020202020204" pitchFamily="34" charset="0"/>
+              <a:buChar char="•"/>
+            </a:pPr>
             <a:r>
               <a:rPr lang="en-US" dirty="0" smtClean="0">
                 <a:solidFill>
@@ -9938,14 +10191,10 @@
                   </a:schemeClr>
                 </a:solidFill>
               </a:rPr>
-              <a:t>LINPACK</a:t>
-            </a:r>
-          </a:p>
-          <a:p>
-            <a:pPr marL="285750" indent="-285750">
-              <a:buFont typeface="Arial" panose="020B0604020202020204" pitchFamily="34" charset="0"/>
-              <a:buChar char="•"/>
-            </a:pPr>
+              <a:t>Hello</a:t>
+            </a:r>
+          </a:p>
+          <a:p>
             <a:endParaRPr lang="en-US" dirty="0">
               <a:solidFill>
                 <a:schemeClr val="tx1">
@@ -9959,19 +10208,6 @@
               <a:buFont typeface="Arial" panose="020B0604020202020204" pitchFamily="34" charset="0"/>
               <a:buChar char="•"/>
             </a:pPr>
-            <a:endParaRPr lang="en-US" dirty="0" smtClean="0">
-              <a:solidFill>
-                <a:schemeClr val="tx1">
-                  <a:lumMod val="85000"/>
-                </a:schemeClr>
-              </a:solidFill>
-            </a:endParaRPr>
-          </a:p>
-          <a:p>
-            <a:pPr marL="285750" indent="-285750">
-              <a:buFont typeface="Arial" panose="020B0604020202020204" pitchFamily="34" charset="0"/>
-              <a:buChar char="•"/>
-            </a:pPr>
             <a:r>
               <a:rPr lang="en-US" dirty="0" smtClean="0">
                 <a:solidFill>
@@ -9980,7 +10216,7 @@
                   </a:schemeClr>
                 </a:solidFill>
               </a:rPr>
-              <a:t>Hello</a:t>
+              <a:t>Switch test</a:t>
             </a:r>
           </a:p>
           <a:p>
@@ -10009,28 +10245,9 @@
                   </a:schemeClr>
                 </a:solidFill>
               </a:rPr>
-              <a:t>Switch test</a:t>
-            </a:r>
-          </a:p>
-          <a:p>
-            <a:pPr marL="285750" indent="-285750">
-              <a:buFont typeface="Arial" panose="020B0604020202020204" pitchFamily="34" charset="0"/>
-              <a:buChar char="•"/>
-            </a:pPr>
-            <a:endParaRPr lang="en-US" dirty="0">
-              <a:solidFill>
-                <a:schemeClr val="tx1">
-                  <a:lumMod val="85000"/>
-                </a:schemeClr>
-              </a:solidFill>
-            </a:endParaRPr>
-          </a:p>
-          <a:p>
-            <a:pPr marL="285750" indent="-285750">
-              <a:buFont typeface="Arial" panose="020B0604020202020204" pitchFamily="34" charset="0"/>
-              <a:buChar char="•"/>
-            </a:pPr>
-            <a:endParaRPr lang="en-US" dirty="0">
+              <a:t>LINPACK</a:t>
+            </a:r>
+            <a:endParaRPr lang="en-US" dirty="0" smtClean="0">
               <a:solidFill>
                 <a:schemeClr val="tx1">
                   <a:lumMod val="85000"/>
@@ -10366,7 +10583,7 @@
         <p:spPr>
           <a:xfrm>
             <a:off x="2840030" y="2040634"/>
-            <a:ext cx="5961070" cy="2862322"/>
+            <a:ext cx="5961070" cy="3139321"/>
           </a:xfrm>
           <a:prstGeom prst="rect">
             <a:avLst/>
@@ -10392,6 +10609,31 @@
                 </a:solidFill>
               </a:rPr>
               <a:t>Pinging tests if the devices can communicate with each other</a:t>
+            </a:r>
+          </a:p>
+          <a:p>
+            <a:endParaRPr lang="en-US" dirty="0" smtClean="0">
+              <a:solidFill>
+                <a:schemeClr val="tx1">
+                  <a:lumMod val="85000"/>
+                </a:schemeClr>
+              </a:solidFill>
+            </a:endParaRPr>
+          </a:p>
+          <a:p>
+            <a:pPr marL="285750" indent="-285750">
+              <a:buFont typeface="Arial" panose="020B0604020202020204" pitchFamily="34" charset="0"/>
+              <a:buChar char="•"/>
+            </a:pPr>
+            <a:r>
+              <a:rPr lang="en-US" dirty="0" smtClean="0">
+                <a:solidFill>
+                  <a:schemeClr val="tx1">
+                    <a:lumMod val="85000"/>
+                  </a:schemeClr>
+                </a:solidFill>
+              </a:rPr>
+              <a:t>Tests all the ODRIODs’ communication</a:t>
             </a:r>
           </a:p>
           <a:p>
@@ -10420,27 +10662,8 @@
                   </a:schemeClr>
                 </a:solidFill>
               </a:rPr>
-              <a:t>Benchmarks the cluster, testing by solving a system of linear equations</a:t>
-            </a:r>
-          </a:p>
-          <a:p>
-            <a:pPr marL="285750" indent="-285750">
-              <a:buFont typeface="Arial" panose="020B0604020202020204" pitchFamily="34" charset="0"/>
-              <a:buChar char="•"/>
-            </a:pPr>
-            <a:endParaRPr lang="en-US" dirty="0" smtClean="0">
-              <a:solidFill>
-                <a:schemeClr val="tx1">
-                  <a:lumMod val="85000"/>
-                </a:schemeClr>
-              </a:solidFill>
-            </a:endParaRPr>
-          </a:p>
-          <a:p>
-            <a:pPr marL="285750" indent="-285750">
-              <a:buFont typeface="Arial" panose="020B0604020202020204" pitchFamily="34" charset="0"/>
-              <a:buChar char="•"/>
-            </a:pPr>
+              <a:t>Tests the </a:t>
+            </a:r>
             <a:r>
               <a:rPr lang="en-US" dirty="0" smtClean="0">
                 <a:solidFill>
@@ -10449,7 +10672,7 @@
                   </a:schemeClr>
                 </a:solidFill>
               </a:rPr>
-              <a:t>Tests all the ODRIODs’ communication</a:t>
+              <a:t>network</a:t>
             </a:r>
           </a:p>
           <a:p>
@@ -10471,15 +10694,21 @@
               <a:buChar char="•"/>
             </a:pPr>
             <a:r>
-              <a:rPr lang="en-US" dirty="0" smtClean="0">
+              <a:rPr lang="en-US" dirty="0">
                 <a:solidFill>
                   <a:schemeClr val="tx1">
                     <a:lumMod val="85000"/>
                   </a:schemeClr>
                 </a:solidFill>
               </a:rPr>
-              <a:t>Tests the network</a:t>
-            </a:r>
+              <a:t>Benchmarks the cluster, testing by solving a system of linear equations</a:t>
+            </a:r>
+          </a:p>
+          <a:p>
+            <a:pPr marL="285750" indent="-285750">
+              <a:buFont typeface="Arial" panose="020B0604020202020204" pitchFamily="34" charset="0"/>
+              <a:buChar char="•"/>
+            </a:pPr>
             <a:endParaRPr lang="en-US" dirty="0">
               <a:solidFill>
                 <a:schemeClr val="tx1">
@@ -10576,8 +10805,8 @@
         </p:nvSpPr>
         <p:spPr>
           <a:xfrm>
-            <a:off x="586935" y="2021489"/>
-            <a:ext cx="8001247" cy="3139321"/>
+            <a:off x="586936" y="2021489"/>
+            <a:ext cx="3583818" cy="3416320"/>
           </a:xfrm>
           <a:prstGeom prst="rect">
             <a:avLst/>
@@ -10748,10 +10977,20 @@
             </a:r>
           </a:p>
           <a:p>
-            <a:pPr marL="285750" indent="-285750">
-              <a:buFont typeface="Arial" panose="020B0604020202020204" pitchFamily="34" charset="0"/>
-              <a:buChar char="•"/>
-            </a:pPr>
+            <a:pPr marL="742950" lvl="1" indent="-285750">
+              <a:buFont typeface="Arial" panose="020B0604020202020204" pitchFamily="34" charset="0"/>
+              <a:buChar char="•"/>
+            </a:pPr>
+            <a:r>
+              <a:rPr lang="en-US" dirty="0" smtClean="0">
+                <a:solidFill>
+                  <a:schemeClr val="tx1">
+                    <a:lumMod val="85000"/>
+                  </a:schemeClr>
+                </a:solidFill>
+              </a:rPr>
+              <a:t>Other message passing protocols</a:t>
+            </a:r>
             <a:endParaRPr lang="en-US" dirty="0">
               <a:solidFill>
                 <a:schemeClr val="tx1">
@@ -10939,7 +11178,7 @@
           <a:p>
             <a:r>
               <a:rPr lang="en-US" dirty="0" smtClean="0"/>
-              <a:t>Demonstration</a:t>
+              <a:t>Prototype</a:t>
             </a:r>
             <a:endParaRPr lang="en-US" dirty="0"/>
           </a:p>

</xml_diff>

<commit_message>
My resume, my and Andrew's resume are in the industrial.tex now. And other changes I made but didn't push yet.
</commit_message>
<xml_diff>
--- a/Documents/ClientPresent2.pptx
+++ b/Documents/ClientPresent2.pptx
@@ -7371,13 +7371,10 @@
               <a:buChar char="•"/>
             </a:pPr>
             <a:r>
-              <a:rPr lang="en-US" sz="2400" dirty="0" err="1" smtClean="0"/>
-              <a:t>Miscellanous</a:t>
-            </a:r>
-            <a:r>
               <a:rPr lang="en-US" sz="2400" dirty="0" smtClean="0"/>
-              <a:t> </a:t>
-            </a:r>
+              <a:t>Miscellaneous </a:t>
+            </a:r>
+            <a:endParaRPr lang="en-US" sz="2400" dirty="0" smtClean="0"/>
           </a:p>
           <a:p>
             <a:pPr marL="742950" lvl="1" indent="-285750">
@@ -7757,11 +7754,7 @@
             </a:pPr>
             <a:r>
               <a:rPr lang="en-US" sz="2400" dirty="0" smtClean="0"/>
-              <a:t>Research </a:t>
-            </a:r>
-            <a:r>
-              <a:rPr lang="en-US" sz="2400" dirty="0" smtClean="0"/>
-              <a:t>Symposium: 4/7/2016</a:t>
+              <a:t>Research Symposium: 4/7/2016</a:t>
             </a:r>
           </a:p>
           <a:p>
@@ -8329,11 +8322,7 @@
             </a:pPr>
             <a:r>
               <a:rPr lang="en-US" sz="2400" dirty="0" smtClean="0"/>
-              <a:t>Snow White and the seven </a:t>
-            </a:r>
-            <a:r>
-              <a:rPr lang="en-US" sz="2400" dirty="0" smtClean="0"/>
-              <a:t>dwarfs</a:t>
+              <a:t>Snow White and the seven dwarfs</a:t>
             </a:r>
           </a:p>
           <a:p>
@@ -9183,7 +9172,6 @@
               <a:rPr lang="en-US" sz="2400" dirty="0" smtClean="0"/>
               <a:t>Python</a:t>
             </a:r>
-            <a:endParaRPr lang="en-US" sz="2400" dirty="0" smtClean="0"/>
           </a:p>
           <a:p>
             <a:endParaRPr lang="en-US" sz="2400" dirty="0" smtClean="0"/>
@@ -9384,7 +9372,6 @@
               <a:rPr lang="en-US" sz="2400" dirty="0" smtClean="0"/>
               <a:t>Hello</a:t>
             </a:r>
-            <a:endParaRPr lang="en-US" sz="2400" dirty="0" smtClean="0"/>
           </a:p>
           <a:p>
             <a:endParaRPr lang="en-US" sz="2400" dirty="0"/>

</xml_diff>